<commit_message>
Ansor: Presentation Final Ver
</commit_message>
<xml_diff>
--- a/Notes/Ansor/Ansor_ Generating High-Performance Tensor Programs for Deep Learning.pptx
+++ b/Notes/Ansor/Ansor_ Generating High-Performance Tensor Programs for Deep Learning.pptx
@@ -43,16 +43,17 @@
     <p:sldId id="288" r:id="rId39"/>
     <p:sldId id="289" r:id="rId40"/>
     <p:sldId id="290" r:id="rId41"/>
+    <p:sldId id="291" r:id="rId42"/>
   </p:sldIdLst>
   <p:sldSz cy="5143500" cx="9144000"/>
   <p:notesSz cx="6858000" cy="9144000"/>
   <p:embeddedFontLst>
     <p:embeddedFont>
       <p:font typeface="Roboto Mono"/>
-      <p:regular r:id="rId42"/>
-      <p:bold r:id="rId43"/>
-      <p:italic r:id="rId44"/>
-      <p:boldItalic r:id="rId45"/>
+      <p:regular r:id="rId43"/>
+      <p:bold r:id="rId44"/>
+      <p:italic r:id="rId45"/>
+      <p:boldItalic r:id="rId46"/>
     </p:embeddedFont>
   </p:embeddedFontLst>
   <p:defaultTextStyle>
@@ -833,7 +834,7 @@
   <p:cSld>
     <p:spTree>
       <p:nvGrpSpPr>
-        <p:cNvPr id="106" name="Shape 106"/>
+        <p:cNvPr id="107" name="Shape 107"/>
         <p:cNvGrpSpPr/>
         <p:nvPr/>
       </p:nvGrpSpPr>
@@ -847,7 +848,7 @@
       </p:grpSpPr>
       <p:sp>
         <p:nvSpPr>
-          <p:cNvPr id="107" name="Google Shape;107;g37ff4214967_0_250:notes"/>
+          <p:cNvPr id="108" name="Google Shape;108;g37ff4214967_0_250:notes"/>
           <p:cNvSpPr/>
           <p:nvPr>
             <p:ph idx="2" type="sldImg"/>
@@ -882,7 +883,7 @@
       </p:sp>
       <p:sp>
         <p:nvSpPr>
-          <p:cNvPr id="108" name="Google Shape;108;g37ff4214967_0_250:notes"/>
+          <p:cNvPr id="109" name="Google Shape;109;g37ff4214967_0_250:notes"/>
           <p:cNvSpPr txBox="1"/>
           <p:nvPr>
             <p:ph idx="1" type="body"/>
@@ -932,7 +933,7 @@
   <p:cSld>
     <p:spTree>
       <p:nvGrpSpPr>
-        <p:cNvPr id="113" name="Shape 113"/>
+        <p:cNvPr id="114" name="Shape 114"/>
         <p:cNvGrpSpPr/>
         <p:nvPr/>
       </p:nvGrpSpPr>
@@ -946,7 +947,7 @@
       </p:grpSpPr>
       <p:sp>
         <p:nvSpPr>
-          <p:cNvPr id="114" name="Google Shape;114;g37ff4214967_0_257:notes"/>
+          <p:cNvPr id="115" name="Google Shape;115;g37ff4214967_0_257:notes"/>
           <p:cNvSpPr/>
           <p:nvPr>
             <p:ph idx="2" type="sldImg"/>
@@ -981,7 +982,7 @@
       </p:sp>
       <p:sp>
         <p:nvSpPr>
-          <p:cNvPr id="115" name="Google Shape;115;g37ff4214967_0_257:notes"/>
+          <p:cNvPr id="116" name="Google Shape;116;g37ff4214967_0_257:notes"/>
           <p:cNvSpPr txBox="1"/>
           <p:nvPr>
             <p:ph idx="1" type="body"/>
@@ -1031,7 +1032,7 @@
   <p:cSld>
     <p:spTree>
       <p:nvGrpSpPr>
-        <p:cNvPr id="120" name="Shape 120"/>
+        <p:cNvPr id="121" name="Shape 121"/>
         <p:cNvGrpSpPr/>
         <p:nvPr/>
       </p:nvGrpSpPr>
@@ -1045,7 +1046,7 @@
       </p:grpSpPr>
       <p:sp>
         <p:nvSpPr>
-          <p:cNvPr id="121" name="Google Shape;121;g37ff4214967_0_0:notes"/>
+          <p:cNvPr id="122" name="Google Shape;122;g37ff4214967_0_0:notes"/>
           <p:cNvSpPr/>
           <p:nvPr>
             <p:ph idx="2" type="sldImg"/>
@@ -1080,7 +1081,7 @@
       </p:sp>
       <p:sp>
         <p:nvSpPr>
-          <p:cNvPr id="122" name="Google Shape;122;g37ff4214967_0_0:notes"/>
+          <p:cNvPr id="123" name="Google Shape;123;g37ff4214967_0_0:notes"/>
           <p:cNvSpPr txBox="1"/>
           <p:nvPr>
             <p:ph idx="1" type="body"/>
@@ -1130,7 +1131,7 @@
   <p:cSld>
     <p:spTree>
       <p:nvGrpSpPr>
-        <p:cNvPr id="126" name="Shape 126"/>
+        <p:cNvPr id="127" name="Shape 127"/>
         <p:cNvGrpSpPr/>
         <p:nvPr/>
       </p:nvGrpSpPr>
@@ -1144,7 +1145,7 @@
       </p:grpSpPr>
       <p:sp>
         <p:nvSpPr>
-          <p:cNvPr id="127" name="Google Shape;127;g37ff4214967_0_7:notes"/>
+          <p:cNvPr id="128" name="Google Shape;128;g37ff4214967_0_7:notes"/>
           <p:cNvSpPr/>
           <p:nvPr>
             <p:ph idx="2" type="sldImg"/>
@@ -1179,7 +1180,7 @@
       </p:sp>
       <p:sp>
         <p:nvSpPr>
-          <p:cNvPr id="128" name="Google Shape;128;g37ff4214967_0_7:notes"/>
+          <p:cNvPr id="129" name="Google Shape;129;g37ff4214967_0_7:notes"/>
           <p:cNvSpPr txBox="1"/>
           <p:nvPr>
             <p:ph idx="1" type="body"/>
@@ -1229,7 +1230,7 @@
   <p:cSld>
     <p:spTree>
       <p:nvGrpSpPr>
-        <p:cNvPr id="133" name="Shape 133"/>
+        <p:cNvPr id="134" name="Shape 134"/>
         <p:cNvGrpSpPr/>
         <p:nvPr/>
       </p:nvGrpSpPr>
@@ -1243,7 +1244,7 @@
       </p:grpSpPr>
       <p:sp>
         <p:nvSpPr>
-          <p:cNvPr id="134" name="Google Shape;134;g37ff4214967_0_226:notes"/>
+          <p:cNvPr id="135" name="Google Shape;135;g37ff4214967_0_226:notes"/>
           <p:cNvSpPr/>
           <p:nvPr>
             <p:ph idx="2" type="sldImg"/>
@@ -1278,7 +1279,7 @@
       </p:sp>
       <p:sp>
         <p:nvSpPr>
-          <p:cNvPr id="135" name="Google Shape;135;g37ff4214967_0_226:notes"/>
+          <p:cNvPr id="136" name="Google Shape;136;g37ff4214967_0_226:notes"/>
           <p:cNvSpPr txBox="1"/>
           <p:nvPr>
             <p:ph idx="1" type="body"/>
@@ -1328,7 +1329,7 @@
   <p:cSld>
     <p:spTree>
       <p:nvGrpSpPr>
-        <p:cNvPr id="140" name="Shape 140"/>
+        <p:cNvPr id="141" name="Shape 141"/>
         <p:cNvGrpSpPr/>
         <p:nvPr/>
       </p:nvGrpSpPr>
@@ -1342,7 +1343,7 @@
       </p:grpSpPr>
       <p:sp>
         <p:nvSpPr>
-          <p:cNvPr id="141" name="Google Shape;141;g37ff4214967_0_16:notes"/>
+          <p:cNvPr id="142" name="Google Shape;142;g37ff4214967_0_16:notes"/>
           <p:cNvSpPr/>
           <p:nvPr>
             <p:ph idx="2" type="sldImg"/>
@@ -1377,7 +1378,7 @@
       </p:sp>
       <p:sp>
         <p:nvSpPr>
-          <p:cNvPr id="142" name="Google Shape;142;g37ff4214967_0_16:notes"/>
+          <p:cNvPr id="143" name="Google Shape;143;g37ff4214967_0_16:notes"/>
           <p:cNvSpPr txBox="1"/>
           <p:nvPr>
             <p:ph idx="1" type="body"/>
@@ -1427,7 +1428,7 @@
   <p:cSld>
     <p:spTree>
       <p:nvGrpSpPr>
-        <p:cNvPr id="153" name="Shape 153"/>
+        <p:cNvPr id="154" name="Shape 154"/>
         <p:cNvGrpSpPr/>
         <p:nvPr/>
       </p:nvGrpSpPr>
@@ -1441,7 +1442,7 @@
       </p:grpSpPr>
       <p:sp>
         <p:nvSpPr>
-          <p:cNvPr id="154" name="Google Shape;154;g37ff4214967_0_233:notes"/>
+          <p:cNvPr id="155" name="Google Shape;155;g37ff4214967_0_233:notes"/>
           <p:cNvSpPr/>
           <p:nvPr>
             <p:ph idx="2" type="sldImg"/>
@@ -1476,7 +1477,7 @@
       </p:sp>
       <p:sp>
         <p:nvSpPr>
-          <p:cNvPr id="155" name="Google Shape;155;g37ff4214967_0_233:notes"/>
+          <p:cNvPr id="156" name="Google Shape;156;g37ff4214967_0_233:notes"/>
           <p:cNvSpPr txBox="1"/>
           <p:nvPr>
             <p:ph idx="1" type="body"/>
@@ -1526,7 +1527,7 @@
   <p:cSld>
     <p:spTree>
       <p:nvGrpSpPr>
-        <p:cNvPr id="170" name="Shape 170"/>
+        <p:cNvPr id="171" name="Shape 171"/>
         <p:cNvGrpSpPr/>
         <p:nvPr/>
       </p:nvGrpSpPr>
@@ -1540,7 +1541,7 @@
       </p:grpSpPr>
       <p:sp>
         <p:nvSpPr>
-          <p:cNvPr id="171" name="Google Shape;171;g37ff4214967_0_279:notes"/>
+          <p:cNvPr id="172" name="Google Shape;172;g37ff4214967_0_279:notes"/>
           <p:cNvSpPr/>
           <p:nvPr>
             <p:ph idx="2" type="sldImg"/>
@@ -1575,7 +1576,7 @@
       </p:sp>
       <p:sp>
         <p:nvSpPr>
-          <p:cNvPr id="172" name="Google Shape;172;g37ff4214967_0_279:notes"/>
+          <p:cNvPr id="173" name="Google Shape;173;g37ff4214967_0_279:notes"/>
           <p:cNvSpPr txBox="1"/>
           <p:nvPr>
             <p:ph idx="1" type="body"/>
@@ -1625,7 +1626,7 @@
   <p:cSld>
     <p:spTree>
       <p:nvGrpSpPr>
-        <p:cNvPr id="176" name="Shape 176"/>
+        <p:cNvPr id="177" name="Shape 177"/>
         <p:cNvGrpSpPr/>
         <p:nvPr/>
       </p:nvGrpSpPr>
@@ -1639,7 +1640,7 @@
       </p:grpSpPr>
       <p:sp>
         <p:nvSpPr>
-          <p:cNvPr id="177" name="Google Shape;177;g37ff4214967_0_288:notes"/>
+          <p:cNvPr id="178" name="Google Shape;178;g37ff4214967_0_288:notes"/>
           <p:cNvSpPr/>
           <p:nvPr>
             <p:ph idx="2" type="sldImg"/>
@@ -1674,7 +1675,7 @@
       </p:sp>
       <p:sp>
         <p:nvSpPr>
-          <p:cNvPr id="178" name="Google Shape;178;g37ff4214967_0_288:notes"/>
+          <p:cNvPr id="179" name="Google Shape;179;g37ff4214967_0_288:notes"/>
           <p:cNvSpPr txBox="1"/>
           <p:nvPr>
             <p:ph idx="1" type="body"/>
@@ -1724,7 +1725,7 @@
   <p:cSld>
     <p:spTree>
       <p:nvGrpSpPr>
-        <p:cNvPr id="182" name="Shape 182"/>
+        <p:cNvPr id="183" name="Shape 183"/>
         <p:cNvGrpSpPr/>
         <p:nvPr/>
       </p:nvGrpSpPr>
@@ -1738,7 +1739,7 @@
       </p:grpSpPr>
       <p:sp>
         <p:nvSpPr>
-          <p:cNvPr id="183" name="Google Shape;183;g37ff4214967_0_306:notes"/>
+          <p:cNvPr id="184" name="Google Shape;184;g37ff4214967_0_306:notes"/>
           <p:cNvSpPr/>
           <p:nvPr>
             <p:ph idx="2" type="sldImg"/>
@@ -1773,7 +1774,7 @@
       </p:sp>
       <p:sp>
         <p:nvSpPr>
-          <p:cNvPr id="184" name="Google Shape;184;g37ff4214967_0_306:notes"/>
+          <p:cNvPr id="185" name="Google Shape;185;g37ff4214967_0_306:notes"/>
           <p:cNvSpPr txBox="1"/>
           <p:nvPr>
             <p:ph idx="1" type="body"/>
@@ -1823,7 +1824,7 @@
   <p:cSld>
     <p:spTree>
       <p:nvGrpSpPr>
-        <p:cNvPr id="56" name="Shape 56"/>
+        <p:cNvPr id="57" name="Shape 57"/>
         <p:cNvGrpSpPr/>
         <p:nvPr/>
       </p:nvGrpSpPr>
@@ -1837,7 +1838,7 @@
       </p:grpSpPr>
       <p:sp>
         <p:nvSpPr>
-          <p:cNvPr id="57" name="Google Shape;57;g380042e44aa_0_106:notes"/>
+          <p:cNvPr id="58" name="Google Shape;58;g380042e44aa_0_106:notes"/>
           <p:cNvSpPr/>
           <p:nvPr>
             <p:ph idx="2" type="sldImg"/>
@@ -1872,7 +1873,7 @@
       </p:sp>
       <p:sp>
         <p:nvSpPr>
-          <p:cNvPr id="58" name="Google Shape;58;g380042e44aa_0_106:notes"/>
+          <p:cNvPr id="59" name="Google Shape;59;g380042e44aa_0_106:notes"/>
           <p:cNvSpPr txBox="1"/>
           <p:nvPr>
             <p:ph idx="1" type="body"/>
@@ -1922,7 +1923,7 @@
   <p:cSld>
     <p:spTree>
       <p:nvGrpSpPr>
-        <p:cNvPr id="189" name="Shape 189"/>
+        <p:cNvPr id="190" name="Shape 190"/>
         <p:cNvGrpSpPr/>
         <p:nvPr/>
       </p:nvGrpSpPr>
@@ -1936,7 +1937,7 @@
       </p:grpSpPr>
       <p:sp>
         <p:nvSpPr>
-          <p:cNvPr id="190" name="Google Shape;190;g37ff4214967_0_313:notes"/>
+          <p:cNvPr id="191" name="Google Shape;191;g37ff4214967_0_313:notes"/>
           <p:cNvSpPr/>
           <p:nvPr>
             <p:ph idx="2" type="sldImg"/>
@@ -1971,7 +1972,7 @@
       </p:sp>
       <p:sp>
         <p:nvSpPr>
-          <p:cNvPr id="191" name="Google Shape;191;g37ff4214967_0_313:notes"/>
+          <p:cNvPr id="192" name="Google Shape;192;g37ff4214967_0_313:notes"/>
           <p:cNvSpPr txBox="1"/>
           <p:nvPr>
             <p:ph idx="1" type="body"/>
@@ -2021,7 +2022,7 @@
   <p:cSld>
     <p:spTree>
       <p:nvGrpSpPr>
-        <p:cNvPr id="195" name="Shape 195"/>
+        <p:cNvPr id="196" name="Shape 196"/>
         <p:cNvGrpSpPr/>
         <p:nvPr/>
       </p:nvGrpSpPr>
@@ -2035,7 +2036,7 @@
       </p:grpSpPr>
       <p:sp>
         <p:nvSpPr>
-          <p:cNvPr id="196" name="Google Shape;196;g380042e44aa_0_7:notes"/>
+          <p:cNvPr id="197" name="Google Shape;197;g380042e44aa_0_7:notes"/>
           <p:cNvSpPr/>
           <p:nvPr>
             <p:ph idx="2" type="sldImg"/>
@@ -2070,7 +2071,7 @@
       </p:sp>
       <p:sp>
         <p:nvSpPr>
-          <p:cNvPr id="197" name="Google Shape;197;g380042e44aa_0_7:notes"/>
+          <p:cNvPr id="198" name="Google Shape;198;g380042e44aa_0_7:notes"/>
           <p:cNvSpPr txBox="1"/>
           <p:nvPr>
             <p:ph idx="1" type="body"/>
@@ -2120,7 +2121,7 @@
   <p:cSld>
     <p:spTree>
       <p:nvGrpSpPr>
-        <p:cNvPr id="201" name="Shape 201"/>
+        <p:cNvPr id="202" name="Shape 202"/>
         <p:cNvGrpSpPr/>
         <p:nvPr/>
       </p:nvGrpSpPr>
@@ -2134,7 +2135,7 @@
       </p:grpSpPr>
       <p:sp>
         <p:nvSpPr>
-          <p:cNvPr id="202" name="Google Shape;202;g380042e44aa_0_2:notes"/>
+          <p:cNvPr id="203" name="Google Shape;203;g380042e44aa_0_2:notes"/>
           <p:cNvSpPr/>
           <p:nvPr>
             <p:ph idx="2" type="sldImg"/>
@@ -2169,7 +2170,7 @@
       </p:sp>
       <p:sp>
         <p:nvSpPr>
-          <p:cNvPr id="203" name="Google Shape;203;g380042e44aa_0_2:notes"/>
+          <p:cNvPr id="204" name="Google Shape;204;g380042e44aa_0_2:notes"/>
           <p:cNvSpPr txBox="1"/>
           <p:nvPr>
             <p:ph idx="1" type="body"/>
@@ -2219,7 +2220,7 @@
   <p:cSld>
     <p:spTree>
       <p:nvGrpSpPr>
-        <p:cNvPr id="207" name="Shape 207"/>
+        <p:cNvPr id="208" name="Shape 208"/>
         <p:cNvGrpSpPr/>
         <p:nvPr/>
       </p:nvGrpSpPr>
@@ -2233,7 +2234,7 @@
       </p:grpSpPr>
       <p:sp>
         <p:nvSpPr>
-          <p:cNvPr id="208" name="Google Shape;208;g380042e44aa_0_77:notes"/>
+          <p:cNvPr id="209" name="Google Shape;209;g380042e44aa_0_77:notes"/>
           <p:cNvSpPr/>
           <p:nvPr>
             <p:ph idx="2" type="sldImg"/>
@@ -2268,7 +2269,7 @@
       </p:sp>
       <p:sp>
         <p:nvSpPr>
-          <p:cNvPr id="209" name="Google Shape;209;g380042e44aa_0_77:notes"/>
+          <p:cNvPr id="210" name="Google Shape;210;g380042e44aa_0_77:notes"/>
           <p:cNvSpPr txBox="1"/>
           <p:nvPr>
             <p:ph idx="1" type="body"/>
@@ -2318,7 +2319,7 @@
   <p:cSld>
     <p:spTree>
       <p:nvGrpSpPr>
-        <p:cNvPr id="213" name="Shape 213"/>
+        <p:cNvPr id="214" name="Shape 214"/>
         <p:cNvGrpSpPr/>
         <p:nvPr/>
       </p:nvGrpSpPr>
@@ -2332,7 +2333,7 @@
       </p:grpSpPr>
       <p:sp>
         <p:nvSpPr>
-          <p:cNvPr id="214" name="Google Shape;214;g380042e44aa_0_182:notes"/>
+          <p:cNvPr id="215" name="Google Shape;215;g380042e44aa_0_182:notes"/>
           <p:cNvSpPr/>
           <p:nvPr>
             <p:ph idx="2" type="sldImg"/>
@@ -2367,7 +2368,7 @@
       </p:sp>
       <p:sp>
         <p:nvSpPr>
-          <p:cNvPr id="215" name="Google Shape;215;g380042e44aa_0_182:notes"/>
+          <p:cNvPr id="216" name="Google Shape;216;g380042e44aa_0_182:notes"/>
           <p:cNvSpPr txBox="1"/>
           <p:nvPr>
             <p:ph idx="1" type="body"/>
@@ -2417,7 +2418,7 @@
   <p:cSld>
     <p:spTree>
       <p:nvGrpSpPr>
-        <p:cNvPr id="222" name="Shape 222"/>
+        <p:cNvPr id="223" name="Shape 223"/>
         <p:cNvGrpSpPr/>
         <p:nvPr/>
       </p:nvGrpSpPr>
@@ -2431,7 +2432,7 @@
       </p:grpSpPr>
       <p:sp>
         <p:nvSpPr>
-          <p:cNvPr id="223" name="Google Shape;223;g380042e44aa_0_133:notes"/>
+          <p:cNvPr id="224" name="Google Shape;224;g380042e44aa_0_133:notes"/>
           <p:cNvSpPr/>
           <p:nvPr>
             <p:ph idx="2" type="sldImg"/>
@@ -2466,7 +2467,7 @@
       </p:sp>
       <p:sp>
         <p:nvSpPr>
-          <p:cNvPr id="224" name="Google Shape;224;g380042e44aa_0_133:notes"/>
+          <p:cNvPr id="225" name="Google Shape;225;g380042e44aa_0_133:notes"/>
           <p:cNvSpPr txBox="1"/>
           <p:nvPr>
             <p:ph idx="1" type="body"/>
@@ -2516,7 +2517,7 @@
   <p:cSld>
     <p:spTree>
       <p:nvGrpSpPr>
-        <p:cNvPr id="229" name="Shape 229"/>
+        <p:cNvPr id="230" name="Shape 230"/>
         <p:cNvGrpSpPr/>
         <p:nvPr/>
       </p:nvGrpSpPr>
@@ -2530,7 +2531,7 @@
       </p:grpSpPr>
       <p:sp>
         <p:nvSpPr>
-          <p:cNvPr id="230" name="Google Shape;230;g380042e44aa_0_98:notes"/>
+          <p:cNvPr id="231" name="Google Shape;231;g380042e44aa_0_98:notes"/>
           <p:cNvSpPr/>
           <p:nvPr>
             <p:ph idx="2" type="sldImg"/>
@@ -2565,7 +2566,7 @@
       </p:sp>
       <p:sp>
         <p:nvSpPr>
-          <p:cNvPr id="231" name="Google Shape;231;g380042e44aa_0_98:notes"/>
+          <p:cNvPr id="232" name="Google Shape;232;g380042e44aa_0_98:notes"/>
           <p:cNvSpPr txBox="1"/>
           <p:nvPr>
             <p:ph idx="1" type="body"/>
@@ -2615,7 +2616,7 @@
   <p:cSld>
     <p:spTree>
       <p:nvGrpSpPr>
-        <p:cNvPr id="236" name="Shape 236"/>
+        <p:cNvPr id="237" name="Shape 237"/>
         <p:cNvGrpSpPr/>
         <p:nvPr/>
       </p:nvGrpSpPr>
@@ -2629,7 +2630,7 @@
       </p:grpSpPr>
       <p:sp>
         <p:nvSpPr>
-          <p:cNvPr id="237" name="Google Shape;237;g380042e44aa_0_17:notes"/>
+          <p:cNvPr id="238" name="Google Shape;238;g380042e44aa_0_17:notes"/>
           <p:cNvSpPr/>
           <p:nvPr>
             <p:ph idx="2" type="sldImg"/>
@@ -2664,7 +2665,7 @@
       </p:sp>
       <p:sp>
         <p:nvSpPr>
-          <p:cNvPr id="238" name="Google Shape;238;g380042e44aa_0_17:notes"/>
+          <p:cNvPr id="239" name="Google Shape;239;g380042e44aa_0_17:notes"/>
           <p:cNvSpPr txBox="1"/>
           <p:nvPr>
             <p:ph idx="1" type="body"/>
@@ -2714,7 +2715,7 @@
   <p:cSld>
     <p:spTree>
       <p:nvGrpSpPr>
-        <p:cNvPr id="244" name="Shape 244"/>
+        <p:cNvPr id="245" name="Shape 245"/>
         <p:cNvGrpSpPr/>
         <p:nvPr/>
       </p:nvGrpSpPr>
@@ -2728,7 +2729,7 @@
       </p:grpSpPr>
       <p:sp>
         <p:nvSpPr>
-          <p:cNvPr id="245" name="Google Shape;245;g380042e44aa_0_59:notes"/>
+          <p:cNvPr id="246" name="Google Shape;246;g380042e44aa_0_59:notes"/>
           <p:cNvSpPr/>
           <p:nvPr>
             <p:ph idx="2" type="sldImg"/>
@@ -2763,7 +2764,7 @@
       </p:sp>
       <p:sp>
         <p:nvSpPr>
-          <p:cNvPr id="246" name="Google Shape;246;g380042e44aa_0_59:notes"/>
+          <p:cNvPr id="247" name="Google Shape;247;g380042e44aa_0_59:notes"/>
           <p:cNvSpPr txBox="1"/>
           <p:nvPr>
             <p:ph idx="1" type="body"/>
@@ -2813,7 +2814,7 @@
   <p:cSld>
     <p:spTree>
       <p:nvGrpSpPr>
-        <p:cNvPr id="251" name="Shape 251"/>
+        <p:cNvPr id="252" name="Shape 252"/>
         <p:cNvGrpSpPr/>
         <p:nvPr/>
       </p:nvGrpSpPr>
@@ -2827,7 +2828,7 @@
       </p:grpSpPr>
       <p:sp>
         <p:nvSpPr>
-          <p:cNvPr id="252" name="Google Shape;252;g380042e44aa_0_50:notes"/>
+          <p:cNvPr id="253" name="Google Shape;253;g380042e44aa_0_50:notes"/>
           <p:cNvSpPr/>
           <p:nvPr>
             <p:ph idx="2" type="sldImg"/>
@@ -2862,7 +2863,7 @@
       </p:sp>
       <p:sp>
         <p:nvSpPr>
-          <p:cNvPr id="253" name="Google Shape;253;g380042e44aa_0_50:notes"/>
+          <p:cNvPr id="254" name="Google Shape;254;g380042e44aa_0_50:notes"/>
           <p:cNvSpPr txBox="1"/>
           <p:nvPr>
             <p:ph idx="1" type="body"/>
@@ -2912,7 +2913,7 @@
   <p:cSld>
     <p:spTree>
       <p:nvGrpSpPr>
-        <p:cNvPr id="62" name="Shape 62"/>
+        <p:cNvPr id="63" name="Shape 63"/>
         <p:cNvGrpSpPr/>
         <p:nvPr/>
       </p:nvGrpSpPr>
@@ -2926,7 +2927,7 @@
       </p:grpSpPr>
       <p:sp>
         <p:nvSpPr>
-          <p:cNvPr id="63" name="Google Shape;63;g380042e44aa_0_163:notes"/>
+          <p:cNvPr id="64" name="Google Shape;64;g380042e44aa_0_163:notes"/>
           <p:cNvSpPr/>
           <p:nvPr>
             <p:ph idx="2" type="sldImg"/>
@@ -2961,7 +2962,7 @@
       </p:sp>
       <p:sp>
         <p:nvSpPr>
-          <p:cNvPr id="64" name="Google Shape;64;g380042e44aa_0_163:notes"/>
+          <p:cNvPr id="65" name="Google Shape;65;g380042e44aa_0_163:notes"/>
           <p:cNvSpPr txBox="1"/>
           <p:nvPr>
             <p:ph idx="1" type="body"/>
@@ -3011,7 +3012,7 @@
   <p:cSld>
     <p:spTree>
       <p:nvGrpSpPr>
-        <p:cNvPr id="260" name="Shape 260"/>
+        <p:cNvPr id="261" name="Shape 261"/>
         <p:cNvGrpSpPr/>
         <p:nvPr/>
       </p:nvGrpSpPr>
@@ -3025,7 +3026,7 @@
       </p:grpSpPr>
       <p:sp>
         <p:nvSpPr>
-          <p:cNvPr id="261" name="Google Shape;261;g380042e44aa_0_68:notes"/>
+          <p:cNvPr id="262" name="Google Shape;262;g380042e44aa_0_68:notes"/>
           <p:cNvSpPr/>
           <p:nvPr>
             <p:ph idx="2" type="sldImg"/>
@@ -3060,7 +3061,7 @@
       </p:sp>
       <p:sp>
         <p:nvSpPr>
-          <p:cNvPr id="262" name="Google Shape;262;g380042e44aa_0_68:notes"/>
+          <p:cNvPr id="263" name="Google Shape;263;g380042e44aa_0_68:notes"/>
           <p:cNvSpPr txBox="1"/>
           <p:nvPr>
             <p:ph idx="1" type="body"/>
@@ -3110,7 +3111,7 @@
   <p:cSld>
     <p:spTree>
       <p:nvGrpSpPr>
-        <p:cNvPr id="268" name="Shape 268"/>
+        <p:cNvPr id="269" name="Shape 269"/>
         <p:cNvGrpSpPr/>
         <p:nvPr/>
       </p:nvGrpSpPr>
@@ -3124,7 +3125,7 @@
       </p:grpSpPr>
       <p:sp>
         <p:nvSpPr>
-          <p:cNvPr id="269" name="Google Shape;269;g380042e44aa_0_92:notes"/>
+          <p:cNvPr id="270" name="Google Shape;270;g380042e44aa_0_92:notes"/>
           <p:cNvSpPr/>
           <p:nvPr>
             <p:ph idx="2" type="sldImg"/>
@@ -3159,7 +3160,7 @@
       </p:sp>
       <p:sp>
         <p:nvSpPr>
-          <p:cNvPr id="270" name="Google Shape;270;g380042e44aa_0_92:notes"/>
+          <p:cNvPr id="271" name="Google Shape;271;g380042e44aa_0_92:notes"/>
           <p:cNvSpPr txBox="1"/>
           <p:nvPr>
             <p:ph idx="1" type="body"/>
@@ -3209,7 +3210,7 @@
   <p:cSld>
     <p:spTree>
       <p:nvGrpSpPr>
-        <p:cNvPr id="275" name="Shape 275"/>
+        <p:cNvPr id="276" name="Shape 276"/>
         <p:cNvGrpSpPr/>
         <p:nvPr/>
       </p:nvGrpSpPr>
@@ -3223,7 +3224,7 @@
       </p:grpSpPr>
       <p:sp>
         <p:nvSpPr>
-          <p:cNvPr id="276" name="Google Shape;276;g380042e44aa_0_123:notes"/>
+          <p:cNvPr id="277" name="Google Shape;277;g380042e44aa_0_123:notes"/>
           <p:cNvSpPr/>
           <p:nvPr>
             <p:ph idx="2" type="sldImg"/>
@@ -3258,7 +3259,7 @@
       </p:sp>
       <p:sp>
         <p:nvSpPr>
-          <p:cNvPr id="277" name="Google Shape;277;g380042e44aa_0_123:notes"/>
+          <p:cNvPr id="278" name="Google Shape;278;g380042e44aa_0_123:notes"/>
           <p:cNvSpPr txBox="1"/>
           <p:nvPr>
             <p:ph idx="1" type="body"/>
@@ -3308,7 +3309,7 @@
   <p:cSld>
     <p:spTree>
       <p:nvGrpSpPr>
-        <p:cNvPr id="281" name="Shape 281"/>
+        <p:cNvPr id="282" name="Shape 282"/>
         <p:cNvGrpSpPr/>
         <p:nvPr/>
       </p:nvGrpSpPr>
@@ -3322,7 +3323,7 @@
       </p:grpSpPr>
       <p:sp>
         <p:nvSpPr>
-          <p:cNvPr id="282" name="Google Shape;282;g380042e44aa_0_112:notes"/>
+          <p:cNvPr id="283" name="Google Shape;283;g380042e44aa_0_112:notes"/>
           <p:cNvSpPr/>
           <p:nvPr>
             <p:ph idx="2" type="sldImg"/>
@@ -3357,7 +3358,7 @@
       </p:sp>
       <p:sp>
         <p:nvSpPr>
-          <p:cNvPr id="283" name="Google Shape;283;g380042e44aa_0_112:notes"/>
+          <p:cNvPr id="284" name="Google Shape;284;g380042e44aa_0_112:notes"/>
           <p:cNvSpPr txBox="1"/>
           <p:nvPr>
             <p:ph idx="1" type="body"/>
@@ -3407,7 +3408,7 @@
   <p:cSld>
     <p:spTree>
       <p:nvGrpSpPr>
-        <p:cNvPr id="287" name="Shape 287"/>
+        <p:cNvPr id="288" name="Shape 288"/>
         <p:cNvGrpSpPr/>
         <p:nvPr/>
       </p:nvGrpSpPr>
@@ -3421,7 +3422,7 @@
       </p:grpSpPr>
       <p:sp>
         <p:nvSpPr>
-          <p:cNvPr id="288" name="Google Shape;288;g380042e44aa_0_128:notes"/>
+          <p:cNvPr id="289" name="Google Shape;289;g380042e44aa_0_128:notes"/>
           <p:cNvSpPr/>
           <p:nvPr>
             <p:ph idx="2" type="sldImg"/>
@@ -3456,7 +3457,7 @@
       </p:sp>
       <p:sp>
         <p:nvSpPr>
-          <p:cNvPr id="289" name="Google Shape;289;g380042e44aa_0_128:notes"/>
+          <p:cNvPr id="290" name="Google Shape;290;g380042e44aa_0_128:notes"/>
           <p:cNvSpPr txBox="1"/>
           <p:nvPr>
             <p:ph idx="1" type="body"/>
@@ -3506,7 +3507,7 @@
   <p:cSld>
     <p:spTree>
       <p:nvGrpSpPr>
-        <p:cNvPr id="293" name="Shape 293"/>
+        <p:cNvPr id="294" name="Shape 294"/>
         <p:cNvGrpSpPr/>
         <p:nvPr/>
       </p:nvGrpSpPr>
@@ -3520,7 +3521,7 @@
       </p:grpSpPr>
       <p:sp>
         <p:nvSpPr>
-          <p:cNvPr id="294" name="Google Shape;294;g380042e44aa_0_190:notes"/>
+          <p:cNvPr id="295" name="Google Shape;295;g380042e44aa_0_190:notes"/>
           <p:cNvSpPr/>
           <p:nvPr>
             <p:ph idx="2" type="sldImg"/>
@@ -3555,7 +3556,7 @@
       </p:sp>
       <p:sp>
         <p:nvSpPr>
-          <p:cNvPr id="295" name="Google Shape;295;g380042e44aa_0_190:notes"/>
+          <p:cNvPr id="296" name="Google Shape;296;g380042e44aa_0_190:notes"/>
           <p:cNvSpPr txBox="1"/>
           <p:nvPr>
             <p:ph idx="1" type="body"/>
@@ -3600,12 +3601,12 @@
 </p:notes>
 </file>
 
-<file path=ppt/notesSlides/notesSlide4.xml><?xml version="1.0" encoding="utf-8"?>
+<file path=ppt/notesSlides/notesSlide36.xml><?xml version="1.0" encoding="utf-8"?>
 <p:notes xmlns:a="http://schemas.openxmlformats.org/drawingml/2006/main" xmlns:r="http://schemas.openxmlformats.org/officeDocument/2006/relationships" xmlns:mc="http://schemas.openxmlformats.org/markup-compatibility/2006" xmlns:mv="urn:schemas-microsoft-com:mac:vml" xmlns:p="http://schemas.openxmlformats.org/presentationml/2006/main" xmlns:c="http://schemas.openxmlformats.org/drawingml/2006/chart" xmlns:dgm="http://schemas.openxmlformats.org/drawingml/2006/diagram" xmlns:o="urn:schemas-microsoft-com:office:office" xmlns:v="urn:schemas-microsoft-com:vml" xmlns:pvml="urn:schemas-microsoft-com:office:powerpoint" xmlns:com="http://schemas.openxmlformats.org/drawingml/2006/compatibility" xmlns:p14="http://schemas.microsoft.com/office/powerpoint/2010/main" xmlns:p15="http://schemas.microsoft.com/office/powerpoint/2012/main" xmlns:ahyp="http://schemas.microsoft.com/office/drawing/2018/hyperlinkcolor" showMasterPhAnim="0" showMasterSp="0">
   <p:cSld>
     <p:spTree>
       <p:nvGrpSpPr>
-        <p:cNvPr id="68" name="Shape 68"/>
+        <p:cNvPr id="300" name="Shape 300"/>
         <p:cNvGrpSpPr/>
         <p:nvPr/>
       </p:nvGrpSpPr>
@@ -3619,7 +3620,7 @@
       </p:grpSpPr>
       <p:sp>
         <p:nvSpPr>
-          <p:cNvPr id="69" name="Google Shape;69;g37ff4214967_0_344:notes"/>
+          <p:cNvPr id="301" name="Google Shape;301;g380042e44aa_0_201:notes"/>
           <p:cNvSpPr/>
           <p:nvPr>
             <p:ph idx="2" type="sldImg"/>
@@ -3654,7 +3655,7 @@
       </p:sp>
       <p:sp>
         <p:nvSpPr>
-          <p:cNvPr id="70" name="Google Shape;70;g37ff4214967_0_344:notes"/>
+          <p:cNvPr id="302" name="Google Shape;302;g380042e44aa_0_201:notes"/>
           <p:cNvSpPr txBox="1"/>
           <p:nvPr>
             <p:ph idx="1" type="body"/>
@@ -3699,12 +3700,12 @@
 </p:notes>
 </file>
 
-<file path=ppt/notesSlides/notesSlide5.xml><?xml version="1.0" encoding="utf-8"?>
+<file path=ppt/notesSlides/notesSlide4.xml><?xml version="1.0" encoding="utf-8"?>
 <p:notes xmlns:a="http://schemas.openxmlformats.org/drawingml/2006/main" xmlns:r="http://schemas.openxmlformats.org/officeDocument/2006/relationships" xmlns:mc="http://schemas.openxmlformats.org/markup-compatibility/2006" xmlns:mv="urn:schemas-microsoft-com:mac:vml" xmlns:p="http://schemas.openxmlformats.org/presentationml/2006/main" xmlns:c="http://schemas.openxmlformats.org/drawingml/2006/chart" xmlns:dgm="http://schemas.openxmlformats.org/drawingml/2006/diagram" xmlns:o="urn:schemas-microsoft-com:office:office" xmlns:v="urn:schemas-microsoft-com:vml" xmlns:pvml="urn:schemas-microsoft-com:office:powerpoint" xmlns:com="http://schemas.openxmlformats.org/drawingml/2006/compatibility" xmlns:p14="http://schemas.microsoft.com/office/powerpoint/2010/main" xmlns:p15="http://schemas.microsoft.com/office/powerpoint/2012/main" xmlns:ahyp="http://schemas.microsoft.com/office/drawing/2018/hyperlinkcolor" showMasterPhAnim="0" showMasterSp="0">
   <p:cSld>
     <p:spTree>
       <p:nvGrpSpPr>
-        <p:cNvPr id="75" name="Shape 75"/>
+        <p:cNvPr id="69" name="Shape 69"/>
         <p:cNvGrpSpPr/>
         <p:nvPr/>
       </p:nvGrpSpPr>
@@ -3718,7 +3719,7 @@
       </p:grpSpPr>
       <p:sp>
         <p:nvSpPr>
-          <p:cNvPr id="76" name="Google Shape;76;g37ff4214967_0_321:notes"/>
+          <p:cNvPr id="70" name="Google Shape;70;g37ff4214967_0_344:notes"/>
           <p:cNvSpPr/>
           <p:nvPr>
             <p:ph idx="2" type="sldImg"/>
@@ -3753,7 +3754,7 @@
       </p:sp>
       <p:sp>
         <p:nvSpPr>
-          <p:cNvPr id="77" name="Google Shape;77;g37ff4214967_0_321:notes"/>
+          <p:cNvPr id="71" name="Google Shape;71;g37ff4214967_0_344:notes"/>
           <p:cNvSpPr txBox="1"/>
           <p:nvPr>
             <p:ph idx="1" type="body"/>
@@ -3798,12 +3799,12 @@
 </p:notes>
 </file>
 
-<file path=ppt/notesSlides/notesSlide6.xml><?xml version="1.0" encoding="utf-8"?>
+<file path=ppt/notesSlides/notesSlide5.xml><?xml version="1.0" encoding="utf-8"?>
 <p:notes xmlns:a="http://schemas.openxmlformats.org/drawingml/2006/main" xmlns:r="http://schemas.openxmlformats.org/officeDocument/2006/relationships" xmlns:mc="http://schemas.openxmlformats.org/markup-compatibility/2006" xmlns:mv="urn:schemas-microsoft-com:mac:vml" xmlns:p="http://schemas.openxmlformats.org/presentationml/2006/main" xmlns:c="http://schemas.openxmlformats.org/drawingml/2006/chart" xmlns:dgm="http://schemas.openxmlformats.org/drawingml/2006/diagram" xmlns:o="urn:schemas-microsoft-com:office:office" xmlns:v="urn:schemas-microsoft-com:vml" xmlns:pvml="urn:schemas-microsoft-com:office:powerpoint" xmlns:com="http://schemas.openxmlformats.org/drawingml/2006/compatibility" xmlns:p14="http://schemas.microsoft.com/office/powerpoint/2010/main" xmlns:p15="http://schemas.microsoft.com/office/powerpoint/2012/main" xmlns:ahyp="http://schemas.microsoft.com/office/drawing/2018/hyperlinkcolor" showMasterPhAnim="0" showMasterSp="0">
   <p:cSld>
     <p:spTree>
       <p:nvGrpSpPr>
-        <p:cNvPr id="81" name="Shape 81"/>
+        <p:cNvPr id="76" name="Shape 76"/>
         <p:cNvGrpSpPr/>
         <p:nvPr/>
       </p:nvGrpSpPr>
@@ -3817,7 +3818,7 @@
       </p:grpSpPr>
       <p:sp>
         <p:nvSpPr>
-          <p:cNvPr id="82" name="Google Shape;82;g37ff4214967_0_328:notes"/>
+          <p:cNvPr id="77" name="Google Shape;77;g37ff4214967_0_321:notes"/>
           <p:cNvSpPr/>
           <p:nvPr>
             <p:ph idx="2" type="sldImg"/>
@@ -3852,7 +3853,7 @@
       </p:sp>
       <p:sp>
         <p:nvSpPr>
-          <p:cNvPr id="83" name="Google Shape;83;g37ff4214967_0_328:notes"/>
+          <p:cNvPr id="78" name="Google Shape;78;g37ff4214967_0_321:notes"/>
           <p:cNvSpPr txBox="1"/>
           <p:nvPr>
             <p:ph idx="1" type="body"/>
@@ -3897,12 +3898,12 @@
 </p:notes>
 </file>
 
-<file path=ppt/notesSlides/notesSlide7.xml><?xml version="1.0" encoding="utf-8"?>
+<file path=ppt/notesSlides/notesSlide6.xml><?xml version="1.0" encoding="utf-8"?>
 <p:notes xmlns:a="http://schemas.openxmlformats.org/drawingml/2006/main" xmlns:r="http://schemas.openxmlformats.org/officeDocument/2006/relationships" xmlns:mc="http://schemas.openxmlformats.org/markup-compatibility/2006" xmlns:mv="urn:schemas-microsoft-com:mac:vml" xmlns:p="http://schemas.openxmlformats.org/presentationml/2006/main" xmlns:c="http://schemas.openxmlformats.org/drawingml/2006/chart" xmlns:dgm="http://schemas.openxmlformats.org/drawingml/2006/diagram" xmlns:o="urn:schemas-microsoft-com:office:office" xmlns:v="urn:schemas-microsoft-com:vml" xmlns:pvml="urn:schemas-microsoft-com:office:powerpoint" xmlns:com="http://schemas.openxmlformats.org/drawingml/2006/compatibility" xmlns:p14="http://schemas.microsoft.com/office/powerpoint/2010/main" xmlns:p15="http://schemas.microsoft.com/office/powerpoint/2012/main" xmlns:ahyp="http://schemas.microsoft.com/office/drawing/2018/hyperlinkcolor" showMasterPhAnim="0" showMasterSp="0">
   <p:cSld>
     <p:spTree>
       <p:nvGrpSpPr>
-        <p:cNvPr id="88" name="Shape 88"/>
+        <p:cNvPr id="82" name="Shape 82"/>
         <p:cNvGrpSpPr/>
         <p:nvPr/>
       </p:nvGrpSpPr>
@@ -3916,7 +3917,7 @@
       </p:grpSpPr>
       <p:sp>
         <p:nvSpPr>
-          <p:cNvPr id="89" name="Google Shape;89;g37ff4214967_0_363:notes"/>
+          <p:cNvPr id="83" name="Google Shape;83;g37ff4214967_0_328:notes"/>
           <p:cNvSpPr/>
           <p:nvPr>
             <p:ph idx="2" type="sldImg"/>
@@ -3951,7 +3952,7 @@
       </p:sp>
       <p:sp>
         <p:nvSpPr>
-          <p:cNvPr id="90" name="Google Shape;90;g37ff4214967_0_363:notes"/>
+          <p:cNvPr id="84" name="Google Shape;84;g37ff4214967_0_328:notes"/>
           <p:cNvSpPr txBox="1"/>
           <p:nvPr>
             <p:ph idx="1" type="body"/>
@@ -3996,12 +3997,12 @@
 </p:notes>
 </file>
 
-<file path=ppt/notesSlides/notesSlide8.xml><?xml version="1.0" encoding="utf-8"?>
+<file path=ppt/notesSlides/notesSlide7.xml><?xml version="1.0" encoding="utf-8"?>
 <p:notes xmlns:a="http://schemas.openxmlformats.org/drawingml/2006/main" xmlns:r="http://schemas.openxmlformats.org/officeDocument/2006/relationships" xmlns:mc="http://schemas.openxmlformats.org/markup-compatibility/2006" xmlns:mv="urn:schemas-microsoft-com:mac:vml" xmlns:p="http://schemas.openxmlformats.org/presentationml/2006/main" xmlns:c="http://schemas.openxmlformats.org/drawingml/2006/chart" xmlns:dgm="http://schemas.openxmlformats.org/drawingml/2006/diagram" xmlns:o="urn:schemas-microsoft-com:office:office" xmlns:v="urn:schemas-microsoft-com:vml" xmlns:pvml="urn:schemas-microsoft-com:office:powerpoint" xmlns:com="http://schemas.openxmlformats.org/drawingml/2006/compatibility" xmlns:p14="http://schemas.microsoft.com/office/powerpoint/2010/main" xmlns:p15="http://schemas.microsoft.com/office/powerpoint/2012/main" xmlns:ahyp="http://schemas.microsoft.com/office/drawing/2018/hyperlinkcolor" showMasterPhAnim="0" showMasterSp="0">
   <p:cSld>
     <p:spTree>
       <p:nvGrpSpPr>
-        <p:cNvPr id="94" name="Shape 94"/>
+        <p:cNvPr id="89" name="Shape 89"/>
         <p:cNvGrpSpPr/>
         <p:nvPr/>
       </p:nvGrpSpPr>
@@ -4015,7 +4016,7 @@
       </p:grpSpPr>
       <p:sp>
         <p:nvSpPr>
-          <p:cNvPr id="95" name="Google Shape;95;g37ff4214967_0_357:notes"/>
+          <p:cNvPr id="90" name="Google Shape;90;g37ff4214967_0_363:notes"/>
           <p:cNvSpPr/>
           <p:nvPr>
             <p:ph idx="2" type="sldImg"/>
@@ -4050,7 +4051,7 @@
       </p:sp>
       <p:sp>
         <p:nvSpPr>
-          <p:cNvPr id="96" name="Google Shape;96;g37ff4214967_0_357:notes"/>
+          <p:cNvPr id="91" name="Google Shape;91;g37ff4214967_0_363:notes"/>
           <p:cNvSpPr txBox="1"/>
           <p:nvPr>
             <p:ph idx="1" type="body"/>
@@ -4095,12 +4096,12 @@
 </p:notes>
 </file>
 
-<file path=ppt/notesSlides/notesSlide9.xml><?xml version="1.0" encoding="utf-8"?>
+<file path=ppt/notesSlides/notesSlide8.xml><?xml version="1.0" encoding="utf-8"?>
 <p:notes xmlns:a="http://schemas.openxmlformats.org/drawingml/2006/main" xmlns:r="http://schemas.openxmlformats.org/officeDocument/2006/relationships" xmlns:mc="http://schemas.openxmlformats.org/markup-compatibility/2006" xmlns:mv="urn:schemas-microsoft-com:mac:vml" xmlns:p="http://schemas.openxmlformats.org/presentationml/2006/main" xmlns:c="http://schemas.openxmlformats.org/drawingml/2006/chart" xmlns:dgm="http://schemas.openxmlformats.org/drawingml/2006/diagram" xmlns:o="urn:schemas-microsoft-com:office:office" xmlns:v="urn:schemas-microsoft-com:vml" xmlns:pvml="urn:schemas-microsoft-com:office:powerpoint" xmlns:com="http://schemas.openxmlformats.org/drawingml/2006/compatibility" xmlns:p14="http://schemas.microsoft.com/office/powerpoint/2010/main" xmlns:p15="http://schemas.microsoft.com/office/powerpoint/2012/main" xmlns:ahyp="http://schemas.microsoft.com/office/drawing/2018/hyperlinkcolor" showMasterPhAnim="0" showMasterSp="0">
   <p:cSld>
     <p:spTree>
       <p:nvGrpSpPr>
-        <p:cNvPr id="100" name="Shape 100"/>
+        <p:cNvPr id="95" name="Shape 95"/>
         <p:cNvGrpSpPr/>
         <p:nvPr/>
       </p:nvGrpSpPr>
@@ -4114,7 +4115,7 @@
       </p:grpSpPr>
       <p:sp>
         <p:nvSpPr>
-          <p:cNvPr id="101" name="Google Shape;101;g37ff4214967_0_273:notes"/>
+          <p:cNvPr id="96" name="Google Shape;96;g37ff4214967_0_357:notes"/>
           <p:cNvSpPr/>
           <p:nvPr>
             <p:ph idx="2" type="sldImg"/>
@@ -4149,7 +4150,106 @@
       </p:sp>
       <p:sp>
         <p:nvSpPr>
+          <p:cNvPr id="97" name="Google Shape;97;g37ff4214967_0_357:notes"/>
+          <p:cNvSpPr txBox="1"/>
+          <p:nvPr>
+            <p:ph idx="1" type="body"/>
+          </p:nvPr>
+        </p:nvSpPr>
+        <p:spPr>
+          <a:xfrm>
+            <a:off x="685800" y="4343400"/>
+            <a:ext cx="5486400" cy="4114800"/>
+          </a:xfrm>
+          <a:prstGeom prst="rect">
+            <a:avLst/>
+          </a:prstGeom>
+        </p:spPr>
+        <p:txBody>
+          <a:bodyPr anchorCtr="0" anchor="t" bIns="91425" lIns="91425" spcFirstLastPara="1" rIns="91425" wrap="square" tIns="91425">
+            <a:noAutofit/>
+          </a:bodyPr>
+          <a:lstStyle/>
+          <a:p>
+            <a:pPr indent="0" lvl="0" marL="0" rtl="0" algn="l">
+              <a:spcBef>
+                <a:spcPts val="0"/>
+              </a:spcBef>
+              <a:spcAft>
+                <a:spcPts val="0"/>
+              </a:spcAft>
+              <a:buNone/>
+            </a:pPr>
+            <a:r>
+              <a:t/>
+            </a:r>
+            <a:endParaRPr/>
+          </a:p>
+        </p:txBody>
+      </p:sp>
+    </p:spTree>
+  </p:cSld>
+  <p:clrMapOvr>
+    <a:masterClrMapping/>
+  </p:clrMapOvr>
+</p:notes>
+</file>
+
+<file path=ppt/notesSlides/notesSlide9.xml><?xml version="1.0" encoding="utf-8"?>
+<p:notes xmlns:a="http://schemas.openxmlformats.org/drawingml/2006/main" xmlns:r="http://schemas.openxmlformats.org/officeDocument/2006/relationships" xmlns:mc="http://schemas.openxmlformats.org/markup-compatibility/2006" xmlns:mv="urn:schemas-microsoft-com:mac:vml" xmlns:p="http://schemas.openxmlformats.org/presentationml/2006/main" xmlns:c="http://schemas.openxmlformats.org/drawingml/2006/chart" xmlns:dgm="http://schemas.openxmlformats.org/drawingml/2006/diagram" xmlns:o="urn:schemas-microsoft-com:office:office" xmlns:v="urn:schemas-microsoft-com:vml" xmlns:pvml="urn:schemas-microsoft-com:office:powerpoint" xmlns:com="http://schemas.openxmlformats.org/drawingml/2006/compatibility" xmlns:p14="http://schemas.microsoft.com/office/powerpoint/2010/main" xmlns:p15="http://schemas.microsoft.com/office/powerpoint/2012/main" xmlns:ahyp="http://schemas.microsoft.com/office/drawing/2018/hyperlinkcolor" showMasterPhAnim="0" showMasterSp="0">
+  <p:cSld>
+    <p:spTree>
+      <p:nvGrpSpPr>
+        <p:cNvPr id="101" name="Shape 101"/>
+        <p:cNvGrpSpPr/>
+        <p:nvPr/>
+      </p:nvGrpSpPr>
+      <p:grpSpPr>
+        <a:xfrm>
+          <a:off x="0" y="0"/>
+          <a:ext cx="0" cy="0"/>
+          <a:chOff x="0" y="0"/>
+          <a:chExt cx="0" cy="0"/>
+        </a:xfrm>
+      </p:grpSpPr>
+      <p:sp>
+        <p:nvSpPr>
           <p:cNvPr id="102" name="Google Shape;102;g37ff4214967_0_273:notes"/>
+          <p:cNvSpPr/>
+          <p:nvPr>
+            <p:ph idx="2" type="sldImg"/>
+          </p:nvPr>
+        </p:nvSpPr>
+        <p:spPr>
+          <a:xfrm>
+            <a:off x="381300" y="685800"/>
+            <a:ext cx="6096000" cy="3429000"/>
+          </a:xfrm>
+          <a:custGeom>
+            <a:rect b="b" l="l" r="r" t="t"/>
+            <a:pathLst>
+              <a:path extrusionOk="0" h="120000" w="120000">
+                <a:moveTo>
+                  <a:pt x="0" y="0"/>
+                </a:moveTo>
+                <a:lnTo>
+                  <a:pt x="120000" y="0"/>
+                </a:lnTo>
+                <a:lnTo>
+                  <a:pt x="120000" y="120000"/>
+                </a:lnTo>
+                <a:lnTo>
+                  <a:pt x="0" y="120000"/>
+                </a:lnTo>
+                <a:close/>
+              </a:path>
+            </a:pathLst>
+          </a:custGeom>
+        </p:spPr>
+      </p:sp>
+      <p:sp>
+        <p:nvSpPr>
+          <p:cNvPr id="103" name="Google Shape;103;g37ff4214967_0_273:notes"/>
           <p:cNvSpPr txBox="1"/>
           <p:nvPr>
             <p:ph idx="1" type="body"/>
@@ -8865,60 +8965,42 @@
           <p:cNvPr id="54" name="Google Shape;54;p13"/>
           <p:cNvSpPr txBox="1"/>
           <p:nvPr>
-            <p:ph type="ctrTitle"/>
+            <p:ph idx="1" type="subTitle"/>
           </p:nvPr>
         </p:nvSpPr>
         <p:spPr>
           <a:xfrm>
-            <a:off x="311708" y="744575"/>
-            <a:ext cx="8520600" cy="2052600"/>
+            <a:off x="311700" y="2834125"/>
+            <a:ext cx="8520600" cy="792600"/>
           </a:xfrm>
           <a:prstGeom prst="rect">
             <a:avLst/>
           </a:prstGeom>
         </p:spPr>
         <p:txBody>
-          <a:bodyPr anchorCtr="0" anchor="b" bIns="91425" lIns="91425" spcFirstLastPara="1" rIns="91425" wrap="square" tIns="91425">
+          <a:bodyPr anchorCtr="0" anchor="t" bIns="91425" lIns="91425" spcFirstLastPara="1" rIns="91425" wrap="square" tIns="91425">
             <a:normAutofit/>
           </a:bodyPr>
           <a:lstStyle/>
           <a:p>
             <a:pPr indent="0" lvl="0" marL="0" rtl="0" algn="ctr">
-              <a:lnSpc>
-                <a:spcPct val="85000"/>
-              </a:lnSpc>
-              <a:spcBef>
-                <a:spcPts val="0"/>
-              </a:spcBef>
-              <a:spcAft>
-                <a:spcPts val="0"/>
-              </a:spcAft>
-              <a:buNone/>
-            </a:pPr>
-            <a:r>
-              <a:rPr lang="en" sz="5930"/>
-              <a:t>Ansor</a:t>
-            </a:r>
-            <a:endParaRPr sz="1700"/>
-          </a:p>
-          <a:p>
-            <a:pPr indent="0" lvl="0" marL="0" rtl="0" algn="ctr">
-              <a:lnSpc>
-                <a:spcPct val="85000"/>
-              </a:lnSpc>
-              <a:spcBef>
-                <a:spcPts val="0"/>
-              </a:spcBef>
-              <a:spcAft>
-                <a:spcPts val="0"/>
-              </a:spcAft>
-              <a:buNone/>
-            </a:pPr>
-            <a:r>
-              <a:rPr lang="en" sz="1700"/>
-              <a:t>Generating High-Performance Tensor Programs for Deep Learning</a:t>
-            </a:r>
-            <a:endParaRPr/>
+              <a:spcBef>
+                <a:spcPts val="0"/>
+              </a:spcBef>
+              <a:spcAft>
+                <a:spcPts val="0"/>
+              </a:spcAft>
+              <a:buNone/>
+            </a:pPr>
+            <a:r>
+              <a:rPr b="1" lang="en" sz="1500"/>
+              <a:t>Authors</a:t>
+            </a:r>
+            <a:r>
+              <a:rPr lang="en" sz="1500"/>
+              <a:t>: Lianmin Zheng, Chengfan Jia, Minmin Sun, Zhao Wu, Cody Hao Yu, Ameer Haj-Ali, Yida Wang, Jun Yang, Danyang Zhuo, Koushik Sen, Joseph E. Gonzalez, Ion Stoica</a:t>
+            </a:r>
+            <a:endParaRPr sz="1500"/>
           </a:p>
         </p:txBody>
       </p:sp>
@@ -8932,7 +9014,7 @@
         </p:nvSpPr>
         <p:spPr>
           <a:xfrm>
-            <a:off x="311700" y="2834125"/>
+            <a:off x="311691" y="3626734"/>
             <a:ext cx="8520600" cy="792600"/>
           </a:xfrm>
           <a:prstGeom prst="rect">
@@ -8955,10 +9037,76 @@
               <a:buNone/>
             </a:pPr>
             <a:r>
+              <a:rPr b="1" lang="en" sz="1500"/>
+              <a:t>Presented by: </a:t>
+            </a:r>
+            <a:r>
               <a:rPr lang="en" sz="1500"/>
               <a:t>Joshua Brodsky</a:t>
             </a:r>
             <a:endParaRPr sz="1500"/>
+          </a:p>
+        </p:txBody>
+      </p:sp>
+      <p:sp>
+        <p:nvSpPr>
+          <p:cNvPr id="56" name="Google Shape;56;p13"/>
+          <p:cNvSpPr txBox="1"/>
+          <p:nvPr>
+            <p:ph type="ctrTitle"/>
+          </p:nvPr>
+        </p:nvSpPr>
+        <p:spPr>
+          <a:xfrm>
+            <a:off x="311708" y="744575"/>
+            <a:ext cx="8520600" cy="2052600"/>
+          </a:xfrm>
+          <a:prstGeom prst="rect">
+            <a:avLst/>
+          </a:prstGeom>
+        </p:spPr>
+        <p:txBody>
+          <a:bodyPr anchorCtr="0" anchor="b" bIns="91425" lIns="91425" spcFirstLastPara="1" rIns="91425" wrap="square" tIns="91425">
+            <a:normAutofit/>
+          </a:bodyPr>
+          <a:lstStyle/>
+          <a:p>
+            <a:pPr indent="0" lvl="0" marL="0" rtl="0" algn="ctr">
+              <a:lnSpc>
+                <a:spcPct val="85000"/>
+              </a:lnSpc>
+              <a:spcBef>
+                <a:spcPts val="0"/>
+              </a:spcBef>
+              <a:spcAft>
+                <a:spcPts val="0"/>
+              </a:spcAft>
+              <a:buNone/>
+            </a:pPr>
+            <a:r>
+              <a:rPr lang="en" sz="5530"/>
+              <a:t>Ansor:</a:t>
+            </a:r>
+            <a:endParaRPr sz="1300"/>
+          </a:p>
+          <a:p>
+            <a:pPr indent="0" lvl="0" marL="0" rtl="0" algn="ctr">
+              <a:lnSpc>
+                <a:spcPct val="85000"/>
+              </a:lnSpc>
+              <a:spcBef>
+                <a:spcPts val="0"/>
+              </a:spcBef>
+              <a:spcAft>
+                <a:spcPts val="0"/>
+              </a:spcAft>
+              <a:buNone/>
+            </a:pPr>
+            <a:r>
+              <a:rPr lang="en" sz="2100"/>
+              <a:t>Generating High-Performance Tensor Programs for Deep Learning</a:t>
+            </a:r>
+            <a:endParaRPr sz="5600"/>
           </a:p>
         </p:txBody>
       </p:sp>
@@ -8975,7 +9123,7 @@
   <p:cSld>
     <p:spTree>
       <p:nvGrpSpPr>
-        <p:cNvPr id="109" name="Shape 109"/>
+        <p:cNvPr id="110" name="Shape 110"/>
         <p:cNvGrpSpPr/>
         <p:nvPr/>
       </p:nvGrpSpPr>
@@ -8989,7 +9137,7 @@
       </p:grpSpPr>
       <p:sp>
         <p:nvSpPr>
-          <p:cNvPr id="110" name="Google Shape;110;p22"/>
+          <p:cNvPr id="111" name="Google Shape;111;p22"/>
           <p:cNvSpPr txBox="1"/>
           <p:nvPr>
             <p:ph type="title"/>
@@ -9029,7 +9177,7 @@
       </p:sp>
       <p:sp>
         <p:nvSpPr>
-          <p:cNvPr id="111" name="Google Shape;111;p22"/>
+          <p:cNvPr id="112" name="Google Shape;112;p22"/>
           <p:cNvSpPr txBox="1"/>
           <p:nvPr>
             <p:ph idx="1" type="body"/>
@@ -9187,7 +9335,7 @@
       </p:sp>
       <p:pic>
         <p:nvPicPr>
-          <p:cNvPr id="112" name="Google Shape;112;p22"/>
+          <p:cNvPr id="113" name="Google Shape;113;p22"/>
           <p:cNvPicPr preferRelativeResize="0"/>
           <p:nvPr/>
         </p:nvPicPr>
@@ -9226,7 +9374,7 @@
   <p:cSld>
     <p:spTree>
       <p:nvGrpSpPr>
-        <p:cNvPr id="116" name="Shape 116"/>
+        <p:cNvPr id="117" name="Shape 117"/>
         <p:cNvGrpSpPr/>
         <p:nvPr/>
       </p:nvGrpSpPr>
@@ -9240,7 +9388,7 @@
       </p:grpSpPr>
       <p:sp>
         <p:nvSpPr>
-          <p:cNvPr id="117" name="Google Shape;117;p23"/>
+          <p:cNvPr id="118" name="Google Shape;118;p23"/>
           <p:cNvSpPr txBox="1"/>
           <p:nvPr>
             <p:ph type="title"/>
@@ -9280,7 +9428,7 @@
       </p:sp>
       <p:pic>
         <p:nvPicPr>
-          <p:cNvPr id="118" name="Google Shape;118;p23"/>
+          <p:cNvPr id="119" name="Google Shape;119;p23"/>
           <p:cNvPicPr preferRelativeResize="0"/>
           <p:nvPr/>
         </p:nvPicPr>
@@ -9308,7 +9456,7 @@
       </p:pic>
       <p:sp>
         <p:nvSpPr>
-          <p:cNvPr id="119" name="Google Shape;119;p23"/>
+          <p:cNvPr id="120" name="Google Shape;120;p23"/>
           <p:cNvSpPr txBox="1"/>
           <p:nvPr>
             <p:ph idx="1" type="body"/>
@@ -9418,7 +9566,7 @@
   <p:cSld>
     <p:spTree>
       <p:nvGrpSpPr>
-        <p:cNvPr id="123" name="Shape 123"/>
+        <p:cNvPr id="124" name="Shape 124"/>
         <p:cNvGrpSpPr/>
         <p:nvPr/>
       </p:nvGrpSpPr>
@@ -9432,7 +9580,7 @@
       </p:grpSpPr>
       <p:sp>
         <p:nvSpPr>
-          <p:cNvPr id="124" name="Google Shape;124;p24"/>
+          <p:cNvPr id="125" name="Google Shape;125;p24"/>
           <p:cNvSpPr txBox="1"/>
           <p:nvPr>
             <p:ph type="title"/>
@@ -9472,7 +9620,7 @@
       </p:sp>
       <p:sp>
         <p:nvSpPr>
-          <p:cNvPr id="125" name="Google Shape;125;p24"/>
+          <p:cNvPr id="126" name="Google Shape;126;p24"/>
           <p:cNvSpPr txBox="1"/>
           <p:nvPr>
             <p:ph idx="1" type="body"/>
@@ -9778,7 +9926,7 @@
   <p:cSld>
     <p:spTree>
       <p:nvGrpSpPr>
-        <p:cNvPr id="129" name="Shape 129"/>
+        <p:cNvPr id="130" name="Shape 130"/>
         <p:cNvGrpSpPr/>
         <p:nvPr/>
       </p:nvGrpSpPr>
@@ -9792,7 +9940,7 @@
       </p:grpSpPr>
       <p:sp>
         <p:nvSpPr>
-          <p:cNvPr id="130" name="Google Shape;130;p25"/>
+          <p:cNvPr id="131" name="Google Shape;131;p25"/>
           <p:cNvSpPr txBox="1"/>
           <p:nvPr>
             <p:ph type="title"/>
@@ -9852,7 +10000,7 @@
       </p:sp>
       <p:sp>
         <p:nvSpPr>
-          <p:cNvPr id="131" name="Google Shape;131;p25"/>
+          <p:cNvPr id="132" name="Google Shape;132;p25"/>
           <p:cNvSpPr txBox="1"/>
           <p:nvPr>
             <p:ph idx="1" type="body"/>
@@ -9945,7 +10093,7 @@
       </p:sp>
       <p:pic>
         <p:nvPicPr>
-          <p:cNvPr id="132" name="Google Shape;132;p25"/>
+          <p:cNvPr id="133" name="Google Shape;133;p25"/>
           <p:cNvPicPr preferRelativeResize="0"/>
           <p:nvPr/>
         </p:nvPicPr>
@@ -9984,7 +10132,7 @@
   <p:cSld>
     <p:spTree>
       <p:nvGrpSpPr>
-        <p:cNvPr id="136" name="Shape 136"/>
+        <p:cNvPr id="137" name="Shape 137"/>
         <p:cNvGrpSpPr/>
         <p:nvPr/>
       </p:nvGrpSpPr>
@@ -9998,7 +10146,7 @@
       </p:grpSpPr>
       <p:sp>
         <p:nvSpPr>
-          <p:cNvPr id="137" name="Google Shape;137;p26"/>
+          <p:cNvPr id="138" name="Google Shape;138;p26"/>
           <p:cNvSpPr txBox="1"/>
           <p:nvPr>
             <p:ph type="title"/>
@@ -10038,7 +10186,7 @@
       </p:sp>
       <p:sp>
         <p:nvSpPr>
-          <p:cNvPr id="138" name="Google Shape;138;p26"/>
+          <p:cNvPr id="139" name="Google Shape;139;p26"/>
           <p:cNvSpPr txBox="1"/>
           <p:nvPr>
             <p:ph idx="1" type="body"/>
@@ -10144,7 +10292,7 @@
       </p:sp>
       <p:pic>
         <p:nvPicPr>
-          <p:cNvPr id="139" name="Google Shape;139;p26"/>
+          <p:cNvPr id="140" name="Google Shape;140;p26"/>
           <p:cNvPicPr preferRelativeResize="0"/>
           <p:nvPr/>
         </p:nvPicPr>
@@ -10183,7 +10331,7 @@
   <p:cSld>
     <p:spTree>
       <p:nvGrpSpPr>
-        <p:cNvPr id="143" name="Shape 143"/>
+        <p:cNvPr id="144" name="Shape 144"/>
         <p:cNvGrpSpPr/>
         <p:nvPr/>
       </p:nvGrpSpPr>
@@ -10197,7 +10345,7 @@
       </p:grpSpPr>
       <p:sp>
         <p:nvSpPr>
-          <p:cNvPr id="144" name="Google Shape;144;p27"/>
+          <p:cNvPr id="145" name="Google Shape;145;p27"/>
           <p:cNvSpPr txBox="1"/>
           <p:nvPr>
             <p:ph type="title"/>
@@ -10277,7 +10425,7 @@
       </p:sp>
       <p:pic>
         <p:nvPicPr>
-          <p:cNvPr id="145" name="Google Shape;145;p27"/>
+          <p:cNvPr id="146" name="Google Shape;146;p27"/>
           <p:cNvPicPr preferRelativeResize="0"/>
           <p:nvPr/>
         </p:nvPicPr>
@@ -10305,7 +10453,7 @@
       </p:pic>
       <p:graphicFrame>
         <p:nvGraphicFramePr>
-          <p:cNvPr id="146" name="Google Shape;146;p27"/>
+          <p:cNvPr id="147" name="Google Shape;147;p27"/>
           <p:cNvGraphicFramePr/>
           <p:nvPr/>
         </p:nvGraphicFramePr>
@@ -10318,7 +10466,7 @@
             <a:tbl>
               <a:tblPr>
                 <a:noFill/>
-                <a:tableStyleId>{CCF21289-B4AC-4C37-9736-0DB1ACAD3D3D}</a:tableStyleId>
+                <a:tableStyleId>{50B07736-B36F-40A3-BC57-D46F4459C891}</a:tableStyleId>
               </a:tblPr>
               <a:tblGrid>
                 <a:gridCol w="3311400"/>
@@ -10561,7 +10709,7 @@
       </p:graphicFrame>
       <p:graphicFrame>
         <p:nvGraphicFramePr>
-          <p:cNvPr id="147" name="Google Shape;147;p27"/>
+          <p:cNvPr id="148" name="Google Shape;148;p27"/>
           <p:cNvGraphicFramePr/>
           <p:nvPr/>
         </p:nvGraphicFramePr>
@@ -10574,7 +10722,7 @@
             <a:tbl>
               <a:tblPr>
                 <a:noFill/>
-                <a:tableStyleId>{CCF21289-B4AC-4C37-9736-0DB1ACAD3D3D}</a:tableStyleId>
+                <a:tableStyleId>{50B07736-B36F-40A3-BC57-D46F4459C891}</a:tableStyleId>
               </a:tblPr>
               <a:tblGrid>
                 <a:gridCol w="3311400"/>
@@ -10821,7 +10969,7 @@
       </p:graphicFrame>
       <p:graphicFrame>
         <p:nvGraphicFramePr>
-          <p:cNvPr id="148" name="Google Shape;148;p27"/>
+          <p:cNvPr id="149" name="Google Shape;149;p27"/>
           <p:cNvGraphicFramePr/>
           <p:nvPr/>
         </p:nvGraphicFramePr>
@@ -10834,7 +10982,7 @@
             <a:tbl>
               <a:tblPr>
                 <a:noFill/>
-                <a:tableStyleId>{CCF21289-B4AC-4C37-9736-0DB1ACAD3D3D}</a:tableStyleId>
+                <a:tableStyleId>{50B07736-B36F-40A3-BC57-D46F4459C891}</a:tableStyleId>
               </a:tblPr>
               <a:tblGrid>
                 <a:gridCol w="3311400"/>
@@ -11138,7 +11286,7 @@
       </p:graphicFrame>
       <p:cxnSp>
         <p:nvCxnSpPr>
-          <p:cNvPr id="149" name="Google Shape;149;p27"/>
+          <p:cNvPr id="150" name="Google Shape;150;p27"/>
           <p:cNvCxnSpPr/>
           <p:nvPr/>
         </p:nvCxnSpPr>
@@ -11166,7 +11314,7 @@
       </p:cxnSp>
       <p:cxnSp>
         <p:nvCxnSpPr>
-          <p:cNvPr id="150" name="Google Shape;150;p27"/>
+          <p:cNvPr id="151" name="Google Shape;151;p27"/>
           <p:cNvCxnSpPr/>
           <p:nvPr/>
         </p:nvCxnSpPr>
@@ -11194,9 +11342,9 @@
       </p:cxnSp>
       <p:cxnSp>
         <p:nvCxnSpPr>
-          <p:cNvPr id="151" name="Google Shape;151;p27"/>
+          <p:cNvPr id="152" name="Google Shape;152;p27"/>
           <p:cNvCxnSpPr>
-            <a:stCxn id="145" idx="3"/>
+            <a:stCxn id="146" idx="3"/>
           </p:cNvCxnSpPr>
           <p:nvPr/>
         </p:nvCxnSpPr>
@@ -11222,7 +11370,7 @@
       </p:cxnSp>
       <p:sp>
         <p:nvSpPr>
-          <p:cNvPr id="152" name="Google Shape;152;p27"/>
+          <p:cNvPr id="153" name="Google Shape;153;p27"/>
           <p:cNvSpPr txBox="1"/>
           <p:nvPr/>
         </p:nvSpPr>
@@ -11282,7 +11430,7 @@
   <p:cSld>
     <p:spTree>
       <p:nvGrpSpPr>
-        <p:cNvPr id="156" name="Shape 156"/>
+        <p:cNvPr id="157" name="Shape 157"/>
         <p:cNvGrpSpPr/>
         <p:nvPr/>
       </p:nvGrpSpPr>
@@ -11296,7 +11444,7 @@
       </p:grpSpPr>
       <p:pic>
         <p:nvPicPr>
-          <p:cNvPr id="157" name="Google Shape;157;p28"/>
+          <p:cNvPr id="158" name="Google Shape;158;p28"/>
           <p:cNvPicPr preferRelativeResize="0"/>
           <p:nvPr/>
         </p:nvPicPr>
@@ -11323,7 +11471,7 @@
       </p:pic>
       <p:sp>
         <p:nvSpPr>
-          <p:cNvPr id="158" name="Google Shape;158;p28"/>
+          <p:cNvPr id="159" name="Google Shape;159;p28"/>
           <p:cNvSpPr txBox="1"/>
           <p:nvPr>
             <p:ph type="title"/>
@@ -11363,7 +11511,7 @@
       </p:sp>
       <p:pic>
         <p:nvPicPr>
-          <p:cNvPr id="159" name="Google Shape;159;p28"/>
+          <p:cNvPr id="160" name="Google Shape;160;p28"/>
           <p:cNvPicPr preferRelativeResize="0"/>
           <p:nvPr/>
         </p:nvPicPr>
@@ -11391,7 +11539,7 @@
       </p:pic>
       <p:pic>
         <p:nvPicPr>
-          <p:cNvPr id="160" name="Google Shape;160;p28"/>
+          <p:cNvPr id="161" name="Google Shape;161;p28"/>
           <p:cNvPicPr preferRelativeResize="0"/>
           <p:nvPr/>
         </p:nvPicPr>
@@ -11418,7 +11566,7 @@
       </p:pic>
       <p:pic>
         <p:nvPicPr>
-          <p:cNvPr id="161" name="Google Shape;161;p28"/>
+          <p:cNvPr id="162" name="Google Shape;162;p28"/>
           <p:cNvPicPr preferRelativeResize="0"/>
           <p:nvPr/>
         </p:nvPicPr>
@@ -11446,7 +11594,7 @@
       </p:pic>
       <p:sp>
         <p:nvSpPr>
-          <p:cNvPr id="162" name="Google Shape;162;p28"/>
+          <p:cNvPr id="163" name="Google Shape;163;p28"/>
           <p:cNvSpPr txBox="1"/>
           <p:nvPr/>
         </p:nvSpPr>
@@ -11485,56 +11633,6 @@
                 </a:solidFill>
               </a:rPr>
               <a:t>Subgraph/Task</a:t>
-            </a:r>
-            <a:endParaRPr sz="1800">
-              <a:solidFill>
-                <a:schemeClr val="dk2"/>
-              </a:solidFill>
-            </a:endParaRPr>
-          </a:p>
-        </p:txBody>
-      </p:sp>
-      <p:sp>
-        <p:nvSpPr>
-          <p:cNvPr id="163" name="Google Shape;163;p28"/>
-          <p:cNvSpPr txBox="1"/>
-          <p:nvPr/>
-        </p:nvSpPr>
-        <p:spPr>
-          <a:xfrm>
-            <a:off x="2929936" y="992003"/>
-            <a:ext cx="2104800" cy="693900"/>
-          </a:xfrm>
-          <a:prstGeom prst="rect">
-            <a:avLst/>
-          </a:prstGeom>
-          <a:noFill/>
-          <a:ln>
-            <a:noFill/>
-          </a:ln>
-        </p:spPr>
-        <p:txBody>
-          <a:bodyPr anchorCtr="0" anchor="t" bIns="91425" lIns="91425" spcFirstLastPara="1" rIns="91425" wrap="square" tIns="91425">
-            <a:noAutofit/>
-          </a:bodyPr>
-          <a:lstStyle/>
-          <a:p>
-            <a:pPr indent="0" lvl="0" marL="0" rtl="0" algn="l">
-              <a:spcBef>
-                <a:spcPts val="0"/>
-              </a:spcBef>
-              <a:spcAft>
-                <a:spcPts val="0"/>
-              </a:spcAft>
-              <a:buNone/>
-            </a:pPr>
-            <a:r>
-              <a:rPr lang="en" sz="1800">
-                <a:solidFill>
-                  <a:schemeClr val="dk2"/>
-                </a:solidFill>
-              </a:rPr>
-              <a:t>Generated Sketch</a:t>
             </a:r>
             <a:endParaRPr sz="1800">
               <a:solidFill>
@@ -11552,7 +11650,7 @@
         </p:nvSpPr>
         <p:spPr>
           <a:xfrm>
-            <a:off x="6680670" y="991532"/>
+            <a:off x="2929936" y="992003"/>
             <a:ext cx="2104800" cy="693900"/>
           </a:xfrm>
           <a:prstGeom prst="rect">
@@ -11584,7 +11682,7 @@
                   <a:schemeClr val="dk2"/>
                 </a:solidFill>
               </a:rPr>
-              <a:t>With Annotations</a:t>
+              <a:t>Generated Sketch</a:t>
             </a:r>
             <a:endParaRPr sz="1800">
               <a:solidFill>
@@ -11602,8 +11700,8 @@
         </p:nvSpPr>
         <p:spPr>
           <a:xfrm>
-            <a:off x="3882750" y="3808875"/>
-            <a:ext cx="1600200" cy="496500"/>
+            <a:off x="6680670" y="991532"/>
+            <a:ext cx="2104800" cy="693900"/>
           </a:xfrm>
           <a:prstGeom prst="rect">
             <a:avLst/>
@@ -11614,6 +11712,56 @@
           </a:ln>
         </p:spPr>
         <p:txBody>
+          <a:bodyPr anchorCtr="0" anchor="t" bIns="91425" lIns="91425" spcFirstLastPara="1" rIns="91425" wrap="square" tIns="91425">
+            <a:noAutofit/>
+          </a:bodyPr>
+          <a:lstStyle/>
+          <a:p>
+            <a:pPr indent="0" lvl="0" marL="0" rtl="0" algn="l">
+              <a:spcBef>
+                <a:spcPts val="0"/>
+              </a:spcBef>
+              <a:spcAft>
+                <a:spcPts val="0"/>
+              </a:spcAft>
+              <a:buNone/>
+            </a:pPr>
+            <a:r>
+              <a:rPr lang="en" sz="1800">
+                <a:solidFill>
+                  <a:schemeClr val="dk2"/>
+                </a:solidFill>
+              </a:rPr>
+              <a:t>With Annotations</a:t>
+            </a:r>
+            <a:endParaRPr sz="1800">
+              <a:solidFill>
+                <a:schemeClr val="dk2"/>
+              </a:solidFill>
+            </a:endParaRPr>
+          </a:p>
+        </p:txBody>
+      </p:sp>
+      <p:sp>
+        <p:nvSpPr>
+          <p:cNvPr id="166" name="Google Shape;166;p28"/>
+          <p:cNvSpPr txBox="1"/>
+          <p:nvPr/>
+        </p:nvSpPr>
+        <p:spPr>
+          <a:xfrm>
+            <a:off x="3882750" y="3808875"/>
+            <a:ext cx="1600200" cy="496500"/>
+          </a:xfrm>
+          <a:prstGeom prst="rect">
+            <a:avLst/>
+          </a:prstGeom>
+          <a:noFill/>
+          <a:ln>
+            <a:noFill/>
+          </a:ln>
+        </p:spPr>
+        <p:txBody>
           <a:bodyPr anchorCtr="0" anchor="ctr" bIns="91425" lIns="91425" spcFirstLastPara="1" rIns="91425" wrap="square" tIns="91425">
             <a:noAutofit/>
           </a:bodyPr>
@@ -11646,7 +11794,7 @@
       </p:sp>
       <p:pic>
         <p:nvPicPr>
-          <p:cNvPr id="166" name="Google Shape;166;p28"/>
+          <p:cNvPr id="167" name="Google Shape;167;p28"/>
           <p:cNvPicPr preferRelativeResize="0"/>
           <p:nvPr/>
         </p:nvPicPr>
@@ -11661,33 +11809,6 @@
           <a:xfrm>
             <a:off x="3648123" y="3917151"/>
             <a:ext cx="234625" cy="279950"/>
-          </a:xfrm>
-          <a:prstGeom prst="rect">
-            <a:avLst/>
-          </a:prstGeom>
-          <a:noFill/>
-          <a:ln>
-            <a:noFill/>
-          </a:ln>
-        </p:spPr>
-      </p:pic>
-      <p:pic>
-        <p:nvPicPr>
-          <p:cNvPr id="167" name="Google Shape;167;p28"/>
-          <p:cNvPicPr preferRelativeResize="0"/>
-          <p:nvPr/>
-        </p:nvPicPr>
-        <p:blipFill rotWithShape="1">
-          <a:blip r:embed="rId3">
-            <a:alphaModFix/>
-          </a:blip>
-          <a:srcRect b="0" l="3143" r="51291" t="0"/>
-          <a:stretch/>
-        </p:blipFill>
-        <p:spPr>
-          <a:xfrm>
-            <a:off x="5482825" y="3883525"/>
-            <a:ext cx="1091650" cy="279950"/>
           </a:xfrm>
           <a:prstGeom prst="rect">
             <a:avLst/>
@@ -11708,13 +11829,13 @@
           <a:blip r:embed="rId3">
             <a:alphaModFix/>
           </a:blip>
-          <a:srcRect b="0" l="2170" r="-2170" t="0"/>
+          <a:srcRect b="0" l="3143" r="51291" t="0"/>
           <a:stretch/>
         </p:blipFill>
         <p:spPr>
           <a:xfrm>
-            <a:off x="6539391" y="3883526"/>
-            <a:ext cx="234625" cy="279950"/>
+            <a:off x="5482825" y="3883525"/>
+            <a:ext cx="1091650" cy="279950"/>
           </a:xfrm>
           <a:prstGeom prst="rect">
             <a:avLst/>
@@ -11725,9 +11846,36 @@
           </a:ln>
         </p:spPr>
       </p:pic>
+      <p:pic>
+        <p:nvPicPr>
+          <p:cNvPr id="169" name="Google Shape;169;p28"/>
+          <p:cNvPicPr preferRelativeResize="0"/>
+          <p:nvPr/>
+        </p:nvPicPr>
+        <p:blipFill rotWithShape="1">
+          <a:blip r:embed="rId3">
+            <a:alphaModFix/>
+          </a:blip>
+          <a:srcRect b="0" l="2170" r="-2170" t="0"/>
+          <a:stretch/>
+        </p:blipFill>
+        <p:spPr>
+          <a:xfrm>
+            <a:off x="6539391" y="3883526"/>
+            <a:ext cx="234625" cy="279950"/>
+          </a:xfrm>
+          <a:prstGeom prst="rect">
+            <a:avLst/>
+          </a:prstGeom>
+          <a:noFill/>
+          <a:ln>
+            <a:noFill/>
+          </a:ln>
+        </p:spPr>
+      </p:pic>
       <p:sp>
         <p:nvSpPr>
-          <p:cNvPr id="169" name="Google Shape;169;p28"/>
+          <p:cNvPr id="170" name="Google Shape;170;p28"/>
           <p:cNvSpPr txBox="1"/>
           <p:nvPr/>
         </p:nvSpPr>
@@ -11788,7 +11936,7 @@
   <p:cSld>
     <p:spTree>
       <p:nvGrpSpPr>
-        <p:cNvPr id="173" name="Shape 173"/>
+        <p:cNvPr id="174" name="Shape 174"/>
         <p:cNvGrpSpPr/>
         <p:nvPr/>
       </p:nvGrpSpPr>
@@ -11802,7 +11950,7 @@
       </p:grpSpPr>
       <p:sp>
         <p:nvSpPr>
-          <p:cNvPr id="174" name="Google Shape;174;p29"/>
+          <p:cNvPr id="175" name="Google Shape;175;p29"/>
           <p:cNvSpPr txBox="1"/>
           <p:nvPr>
             <p:ph type="ctrTitle"/>
@@ -11842,7 +11990,7 @@
       </p:sp>
       <p:sp>
         <p:nvSpPr>
-          <p:cNvPr id="175" name="Google Shape;175;p29"/>
+          <p:cNvPr id="176" name="Google Shape;176;p29"/>
           <p:cNvSpPr txBox="1"/>
           <p:nvPr>
             <p:ph idx="1" type="subTitle"/>
@@ -11892,7 +12040,7 @@
   <p:cSld>
     <p:spTree>
       <p:nvGrpSpPr>
-        <p:cNvPr id="179" name="Shape 179"/>
+        <p:cNvPr id="180" name="Shape 180"/>
         <p:cNvGrpSpPr/>
         <p:nvPr/>
       </p:nvGrpSpPr>
@@ -11906,7 +12054,7 @@
       </p:grpSpPr>
       <p:sp>
         <p:nvSpPr>
-          <p:cNvPr id="180" name="Google Shape;180;p30"/>
+          <p:cNvPr id="181" name="Google Shape;181;p30"/>
           <p:cNvSpPr txBox="1"/>
           <p:nvPr>
             <p:ph idx="1" type="body"/>
@@ -12140,7 +12288,7 @@
       </p:sp>
       <p:sp>
         <p:nvSpPr>
-          <p:cNvPr id="181" name="Google Shape;181;p30"/>
+          <p:cNvPr id="182" name="Google Shape;182;p30"/>
           <p:cNvSpPr txBox="1"/>
           <p:nvPr>
             <p:ph type="title"/>
@@ -12195,7 +12343,7 @@
   <p:cSld>
     <p:spTree>
       <p:nvGrpSpPr>
-        <p:cNvPr id="185" name="Shape 185"/>
+        <p:cNvPr id="186" name="Shape 186"/>
         <p:cNvGrpSpPr/>
         <p:nvPr/>
       </p:nvGrpSpPr>
@@ -12209,7 +12357,7 @@
       </p:grpSpPr>
       <p:sp>
         <p:nvSpPr>
-          <p:cNvPr id="186" name="Google Shape;186;p31"/>
+          <p:cNvPr id="187" name="Google Shape;187;p31"/>
           <p:cNvSpPr txBox="1"/>
           <p:nvPr>
             <p:ph type="title"/>
@@ -12249,7 +12397,7 @@
       </p:sp>
       <p:sp>
         <p:nvSpPr>
-          <p:cNvPr id="187" name="Google Shape;187;p31"/>
+          <p:cNvPr id="188" name="Google Shape;188;p31"/>
           <p:cNvSpPr txBox="1"/>
           <p:nvPr>
             <p:ph idx="1" type="body"/>
@@ -12507,7 +12655,7 @@
       </p:sp>
       <p:pic>
         <p:nvPicPr>
-          <p:cNvPr id="188" name="Google Shape;188;p31"/>
+          <p:cNvPr id="189" name="Google Shape;189;p31"/>
           <p:cNvPicPr preferRelativeResize="0"/>
           <p:nvPr/>
         </p:nvPicPr>
@@ -12546,7 +12694,7 @@
   <p:cSld>
     <p:spTree>
       <p:nvGrpSpPr>
-        <p:cNvPr id="59" name="Shape 59"/>
+        <p:cNvPr id="60" name="Shape 60"/>
         <p:cNvGrpSpPr/>
         <p:nvPr/>
       </p:nvGrpSpPr>
@@ -12560,7 +12708,7 @@
       </p:grpSpPr>
       <p:sp>
         <p:nvSpPr>
-          <p:cNvPr id="60" name="Google Shape;60;p14"/>
+          <p:cNvPr id="61" name="Google Shape;61;p14"/>
           <p:cNvSpPr txBox="1"/>
           <p:nvPr>
             <p:ph type="title"/>
@@ -12600,7 +12748,7 @@
       </p:sp>
       <p:sp>
         <p:nvSpPr>
-          <p:cNvPr id="61" name="Google Shape;61;p14"/>
+          <p:cNvPr id="62" name="Google Shape;62;p14"/>
           <p:cNvSpPr txBox="1"/>
           <p:nvPr>
             <p:ph idx="1" type="body"/>
@@ -12794,7 +12942,7 @@
   <p:cSld>
     <p:spTree>
       <p:nvGrpSpPr>
-        <p:cNvPr id="192" name="Shape 192"/>
+        <p:cNvPr id="193" name="Shape 193"/>
         <p:cNvGrpSpPr/>
         <p:nvPr/>
       </p:nvGrpSpPr>
@@ -12808,7 +12956,7 @@
       </p:grpSpPr>
       <p:sp>
         <p:nvSpPr>
-          <p:cNvPr id="193" name="Google Shape;193;p32"/>
+          <p:cNvPr id="194" name="Google Shape;194;p32"/>
           <p:cNvSpPr txBox="1"/>
           <p:nvPr>
             <p:ph type="title"/>
@@ -12868,7 +13016,7 @@
       </p:sp>
       <p:sp>
         <p:nvSpPr>
-          <p:cNvPr id="194" name="Google Shape;194;p32"/>
+          <p:cNvPr id="195" name="Google Shape;195;p32"/>
           <p:cNvSpPr txBox="1"/>
           <p:nvPr>
             <p:ph idx="1" type="body"/>
@@ -13048,7 +13196,7 @@
   <p:cSld>
     <p:spTree>
       <p:nvGrpSpPr>
-        <p:cNvPr id="198" name="Shape 198"/>
+        <p:cNvPr id="199" name="Shape 199"/>
         <p:cNvGrpSpPr/>
         <p:nvPr/>
       </p:nvGrpSpPr>
@@ -13062,7 +13210,7 @@
       </p:grpSpPr>
       <p:sp>
         <p:nvSpPr>
-          <p:cNvPr id="199" name="Google Shape;199;p33"/>
+          <p:cNvPr id="200" name="Google Shape;200;p33"/>
           <p:cNvSpPr txBox="1"/>
           <p:nvPr>
             <p:ph type="ctrTitle"/>
@@ -13102,7 +13250,7 @@
       </p:sp>
       <p:sp>
         <p:nvSpPr>
-          <p:cNvPr id="200" name="Google Shape;200;p33"/>
+          <p:cNvPr id="201" name="Google Shape;201;p33"/>
           <p:cNvSpPr txBox="1"/>
           <p:nvPr>
             <p:ph idx="1" type="subTitle"/>
@@ -13152,7 +13300,7 @@
   <p:cSld>
     <p:spTree>
       <p:nvGrpSpPr>
-        <p:cNvPr id="204" name="Shape 204"/>
+        <p:cNvPr id="205" name="Shape 205"/>
         <p:cNvGrpSpPr/>
         <p:nvPr/>
       </p:nvGrpSpPr>
@@ -13166,7 +13314,7 @@
       </p:grpSpPr>
       <p:sp>
         <p:nvSpPr>
-          <p:cNvPr id="205" name="Google Shape;205;p34"/>
+          <p:cNvPr id="206" name="Google Shape;206;p34"/>
           <p:cNvSpPr txBox="1"/>
           <p:nvPr>
             <p:ph idx="1" type="body"/>
@@ -13345,7 +13493,7 @@
       </p:sp>
       <p:sp>
         <p:nvSpPr>
-          <p:cNvPr id="206" name="Google Shape;206;p34"/>
+          <p:cNvPr id="207" name="Google Shape;207;p34"/>
           <p:cNvSpPr txBox="1"/>
           <p:nvPr>
             <p:ph type="title"/>
@@ -13396,7 +13544,7 @@
   <p:cSld>
     <p:spTree>
       <p:nvGrpSpPr>
-        <p:cNvPr id="210" name="Shape 210"/>
+        <p:cNvPr id="211" name="Shape 211"/>
         <p:cNvGrpSpPr/>
         <p:nvPr/>
       </p:nvGrpSpPr>
@@ -13410,7 +13558,7 @@
       </p:grpSpPr>
       <p:sp>
         <p:nvSpPr>
-          <p:cNvPr id="211" name="Google Shape;211;p35"/>
+          <p:cNvPr id="212" name="Google Shape;212;p35"/>
           <p:cNvSpPr txBox="1"/>
           <p:nvPr>
             <p:ph type="title"/>
@@ -13450,7 +13598,7 @@
       </p:sp>
       <p:sp>
         <p:nvSpPr>
-          <p:cNvPr id="212" name="Google Shape;212;p35"/>
+          <p:cNvPr id="213" name="Google Shape;213;p35"/>
           <p:cNvSpPr txBox="1"/>
           <p:nvPr>
             <p:ph idx="1" type="body"/>
@@ -13672,7 +13820,7 @@
   <p:cSld>
     <p:spTree>
       <p:nvGrpSpPr>
-        <p:cNvPr id="216" name="Shape 216"/>
+        <p:cNvPr id="217" name="Shape 217"/>
         <p:cNvGrpSpPr/>
         <p:nvPr/>
       </p:nvGrpSpPr>
@@ -13686,7 +13834,7 @@
       </p:grpSpPr>
       <p:sp>
         <p:nvSpPr>
-          <p:cNvPr id="217" name="Google Shape;217;p36"/>
+          <p:cNvPr id="218" name="Google Shape;218;p36"/>
           <p:cNvSpPr txBox="1"/>
           <p:nvPr>
             <p:ph type="title"/>
@@ -13726,7 +13874,7 @@
       </p:sp>
       <p:sp>
         <p:nvSpPr>
-          <p:cNvPr id="218" name="Google Shape;218;p36"/>
+          <p:cNvPr id="219" name="Google Shape;219;p36"/>
           <p:cNvSpPr txBox="1"/>
           <p:nvPr>
             <p:ph idx="1" type="body"/>
@@ -13766,7 +13914,7 @@
       </p:sp>
       <p:pic>
         <p:nvPicPr>
-          <p:cNvPr id="219" name="Google Shape;219;p36"/>
+          <p:cNvPr id="220" name="Google Shape;220;p36"/>
           <p:cNvPicPr preferRelativeResize="0"/>
           <p:nvPr/>
         </p:nvPicPr>
@@ -13793,7 +13941,7 @@
       </p:pic>
       <p:pic>
         <p:nvPicPr>
-          <p:cNvPr id="220" name="Google Shape;220;p36"/>
+          <p:cNvPr id="221" name="Google Shape;221;p36"/>
           <p:cNvPicPr preferRelativeResize="0"/>
           <p:nvPr/>
         </p:nvPicPr>
@@ -13821,7 +13969,7 @@
       </p:pic>
       <p:pic>
         <p:nvPicPr>
-          <p:cNvPr id="221" name="Google Shape;221;p36"/>
+          <p:cNvPr id="222" name="Google Shape;222;p36"/>
           <p:cNvPicPr preferRelativeResize="0"/>
           <p:nvPr/>
         </p:nvPicPr>
@@ -13860,7 +14008,7 @@
   <p:cSld>
     <p:spTree>
       <p:nvGrpSpPr>
-        <p:cNvPr id="225" name="Shape 225"/>
+        <p:cNvPr id="226" name="Shape 226"/>
         <p:cNvGrpSpPr/>
         <p:nvPr/>
       </p:nvGrpSpPr>
@@ -13874,7 +14022,7 @@
       </p:grpSpPr>
       <p:sp>
         <p:nvSpPr>
-          <p:cNvPr id="226" name="Google Shape;226;p37"/>
+          <p:cNvPr id="227" name="Google Shape;227;p37"/>
           <p:cNvSpPr txBox="1"/>
           <p:nvPr>
             <p:ph type="title"/>
@@ -13914,7 +14062,7 @@
       </p:sp>
       <p:sp>
         <p:nvSpPr>
-          <p:cNvPr id="227" name="Google Shape;227;p37"/>
+          <p:cNvPr id="228" name="Google Shape;228;p37"/>
           <p:cNvSpPr txBox="1"/>
           <p:nvPr>
             <p:ph idx="1" type="body"/>
@@ -13970,7 +14118,7 @@
       </p:sp>
       <p:pic>
         <p:nvPicPr>
-          <p:cNvPr id="228" name="Google Shape;228;p37"/>
+          <p:cNvPr id="229" name="Google Shape;229;p37"/>
           <p:cNvPicPr preferRelativeResize="0"/>
           <p:nvPr/>
         </p:nvPicPr>
@@ -14009,7 +14157,7 @@
   <p:cSld>
     <p:spTree>
       <p:nvGrpSpPr>
-        <p:cNvPr id="232" name="Shape 232"/>
+        <p:cNvPr id="233" name="Shape 233"/>
         <p:cNvGrpSpPr/>
         <p:nvPr/>
       </p:nvGrpSpPr>
@@ -14023,7 +14171,7 @@
       </p:grpSpPr>
       <p:sp>
         <p:nvSpPr>
-          <p:cNvPr id="233" name="Google Shape;233;p38"/>
+          <p:cNvPr id="234" name="Google Shape;234;p38"/>
           <p:cNvSpPr txBox="1"/>
           <p:nvPr>
             <p:ph type="title"/>
@@ -14063,7 +14211,7 @@
       </p:sp>
       <p:pic>
         <p:nvPicPr>
-          <p:cNvPr id="234" name="Google Shape;234;p38"/>
+          <p:cNvPr id="235" name="Google Shape;235;p38"/>
           <p:cNvPicPr preferRelativeResize="0"/>
           <p:nvPr/>
         </p:nvPicPr>
@@ -14091,7 +14239,7 @@
       </p:pic>
       <p:sp>
         <p:nvSpPr>
-          <p:cNvPr id="235" name="Google Shape;235;p38"/>
+          <p:cNvPr id="236" name="Google Shape;236;p38"/>
           <p:cNvSpPr txBox="1"/>
           <p:nvPr/>
         </p:nvSpPr>
@@ -14236,7 +14384,7 @@
   <p:cSld>
     <p:spTree>
       <p:nvGrpSpPr>
-        <p:cNvPr id="239" name="Shape 239"/>
+        <p:cNvPr id="240" name="Shape 240"/>
         <p:cNvGrpSpPr/>
         <p:nvPr/>
       </p:nvGrpSpPr>
@@ -14250,7 +14398,7 @@
       </p:grpSpPr>
       <p:sp>
         <p:nvSpPr>
-          <p:cNvPr id="240" name="Google Shape;240;p39"/>
+          <p:cNvPr id="241" name="Google Shape;241;p39"/>
           <p:cNvSpPr txBox="1"/>
           <p:nvPr>
             <p:ph type="title"/>
@@ -14310,7 +14458,7 @@
       </p:sp>
       <p:pic>
         <p:nvPicPr>
-          <p:cNvPr id="241" name="Google Shape;241;p39"/>
+          <p:cNvPr id="242" name="Google Shape;242;p39"/>
           <p:cNvPicPr preferRelativeResize="0"/>
           <p:nvPr/>
         </p:nvPicPr>
@@ -14338,7 +14486,7 @@
       </p:pic>
       <p:sp>
         <p:nvSpPr>
-          <p:cNvPr id="242" name="Google Shape;242;p39"/>
+          <p:cNvPr id="243" name="Google Shape;243;p39"/>
           <p:cNvSpPr txBox="1"/>
           <p:nvPr/>
         </p:nvSpPr>
@@ -14388,7 +14536,7 @@
       </p:sp>
       <p:sp>
         <p:nvSpPr>
-          <p:cNvPr id="243" name="Google Shape;243;p39"/>
+          <p:cNvPr id="244" name="Google Shape;244;p39"/>
           <p:cNvSpPr txBox="1"/>
           <p:nvPr/>
         </p:nvSpPr>
@@ -14788,7 +14936,7 @@
   <p:cSld>
     <p:spTree>
       <p:nvGrpSpPr>
-        <p:cNvPr id="247" name="Shape 247"/>
+        <p:cNvPr id="248" name="Shape 248"/>
         <p:cNvGrpSpPr/>
         <p:nvPr/>
       </p:nvGrpSpPr>
@@ -14802,7 +14950,7 @@
       </p:grpSpPr>
       <p:sp>
         <p:nvSpPr>
-          <p:cNvPr id="248" name="Google Shape;248;p40"/>
+          <p:cNvPr id="249" name="Google Shape;249;p40"/>
           <p:cNvSpPr txBox="1"/>
           <p:nvPr>
             <p:ph type="title"/>
@@ -14861,7 +15009,7 @@
       </p:sp>
       <p:pic>
         <p:nvPicPr>
-          <p:cNvPr id="249" name="Google Shape;249;p40"/>
+          <p:cNvPr id="250" name="Google Shape;250;p40"/>
           <p:cNvPicPr preferRelativeResize="0"/>
           <p:nvPr/>
         </p:nvPicPr>
@@ -14889,7 +15037,7 @@
       </p:pic>
       <p:sp>
         <p:nvSpPr>
-          <p:cNvPr id="250" name="Google Shape;250;p40"/>
+          <p:cNvPr id="251" name="Google Shape;251;p40"/>
           <p:cNvSpPr txBox="1"/>
           <p:nvPr/>
         </p:nvSpPr>
@@ -15132,7 +15280,7 @@
   <p:cSld>
     <p:spTree>
       <p:nvGrpSpPr>
-        <p:cNvPr id="254" name="Shape 254"/>
+        <p:cNvPr id="255" name="Shape 255"/>
         <p:cNvGrpSpPr/>
         <p:nvPr/>
       </p:nvGrpSpPr>
@@ -15146,7 +15294,7 @@
       </p:grpSpPr>
       <p:sp>
         <p:nvSpPr>
-          <p:cNvPr id="255" name="Google Shape;255;p41"/>
+          <p:cNvPr id="256" name="Google Shape;256;p41"/>
           <p:cNvSpPr txBox="1"/>
           <p:nvPr>
             <p:ph type="title"/>
@@ -15201,7 +15349,7 @@
       </p:sp>
       <p:pic>
         <p:nvPicPr>
-          <p:cNvPr id="256" name="Google Shape;256;p41"/>
+          <p:cNvPr id="257" name="Google Shape;257;p41"/>
           <p:cNvPicPr preferRelativeResize="0"/>
           <p:nvPr/>
         </p:nvPicPr>
@@ -15229,7 +15377,7 @@
       </p:pic>
       <p:sp>
         <p:nvSpPr>
-          <p:cNvPr id="257" name="Google Shape;257;p41"/>
+          <p:cNvPr id="258" name="Google Shape;258;p41"/>
           <p:cNvSpPr txBox="1"/>
           <p:nvPr/>
         </p:nvSpPr>
@@ -15279,7 +15427,7 @@
       </p:sp>
       <p:sp>
         <p:nvSpPr>
-          <p:cNvPr id="258" name="Google Shape;258;p41"/>
+          <p:cNvPr id="259" name="Google Shape;259;p41"/>
           <p:cNvSpPr txBox="1"/>
           <p:nvPr/>
         </p:nvSpPr>
@@ -15652,7 +15800,7 @@
       </p:sp>
       <p:pic>
         <p:nvPicPr>
-          <p:cNvPr id="259" name="Google Shape;259;p41"/>
+          <p:cNvPr id="260" name="Google Shape;260;p41"/>
           <p:cNvPicPr preferRelativeResize="0"/>
           <p:nvPr/>
         </p:nvPicPr>
@@ -15690,7 +15838,7 @@
   <p:cSld>
     <p:spTree>
       <p:nvGrpSpPr>
-        <p:cNvPr id="65" name="Shape 65"/>
+        <p:cNvPr id="66" name="Shape 66"/>
         <p:cNvGrpSpPr/>
         <p:nvPr/>
       </p:nvGrpSpPr>
@@ -15704,7 +15852,7 @@
       </p:grpSpPr>
       <p:sp>
         <p:nvSpPr>
-          <p:cNvPr id="66" name="Google Shape;66;p15"/>
+          <p:cNvPr id="67" name="Google Shape;67;p15"/>
           <p:cNvSpPr txBox="1"/>
           <p:nvPr>
             <p:ph type="title"/>
@@ -15744,7 +15892,7 @@
       </p:sp>
       <p:sp>
         <p:nvSpPr>
-          <p:cNvPr id="67" name="Google Shape;67;p15"/>
+          <p:cNvPr id="68" name="Google Shape;68;p15"/>
           <p:cNvSpPr txBox="1"/>
           <p:nvPr>
             <p:ph idx="1" type="body"/>
@@ -15955,7 +16103,7 @@
   <p:cSld>
     <p:spTree>
       <p:nvGrpSpPr>
-        <p:cNvPr id="263" name="Shape 263"/>
+        <p:cNvPr id="264" name="Shape 264"/>
         <p:cNvGrpSpPr/>
         <p:nvPr/>
       </p:nvGrpSpPr>
@@ -15969,7 +16117,7 @@
       </p:grpSpPr>
       <p:sp>
         <p:nvSpPr>
-          <p:cNvPr id="264" name="Google Shape;264;p42"/>
+          <p:cNvPr id="265" name="Google Shape;265;p42"/>
           <p:cNvSpPr txBox="1"/>
           <p:nvPr>
             <p:ph type="title"/>
@@ -16024,7 +16172,7 @@
       </p:sp>
       <p:sp>
         <p:nvSpPr>
-          <p:cNvPr id="265" name="Google Shape;265;p42"/>
+          <p:cNvPr id="266" name="Google Shape;266;p42"/>
           <p:cNvSpPr txBox="1"/>
           <p:nvPr/>
         </p:nvSpPr>
@@ -16368,7 +16516,7 @@
       </p:sp>
       <p:pic>
         <p:nvPicPr>
-          <p:cNvPr id="266" name="Google Shape;266;p42"/>
+          <p:cNvPr id="267" name="Google Shape;267;p42"/>
           <p:cNvPicPr preferRelativeResize="0"/>
           <p:nvPr/>
         </p:nvPicPr>
@@ -16395,7 +16543,7 @@
       </p:pic>
       <p:pic>
         <p:nvPicPr>
-          <p:cNvPr id="267" name="Google Shape;267;p42"/>
+          <p:cNvPr id="268" name="Google Shape;268;p42"/>
           <p:cNvPicPr preferRelativeResize="0"/>
           <p:nvPr/>
         </p:nvPicPr>
@@ -16433,7 +16581,7 @@
   <p:cSld>
     <p:spTree>
       <p:nvGrpSpPr>
-        <p:cNvPr id="271" name="Shape 271"/>
+        <p:cNvPr id="272" name="Shape 272"/>
         <p:cNvGrpSpPr/>
         <p:nvPr/>
       </p:nvGrpSpPr>
@@ -16447,7 +16595,7 @@
       </p:grpSpPr>
       <p:sp>
         <p:nvSpPr>
-          <p:cNvPr id="272" name="Google Shape;272;p43"/>
+          <p:cNvPr id="273" name="Google Shape;273;p43"/>
           <p:cNvSpPr txBox="1"/>
           <p:nvPr/>
         </p:nvSpPr>
@@ -16722,7 +16870,7 @@
       </p:sp>
       <p:sp>
         <p:nvSpPr>
-          <p:cNvPr id="273" name="Google Shape;273;p43"/>
+          <p:cNvPr id="274" name="Google Shape;274;p43"/>
           <p:cNvSpPr txBox="1"/>
           <p:nvPr>
             <p:ph type="title"/>
@@ -16777,7 +16925,7 @@
       </p:sp>
       <p:pic>
         <p:nvPicPr>
-          <p:cNvPr id="274" name="Google Shape;274;p43"/>
+          <p:cNvPr id="275" name="Google Shape;275;p43"/>
           <p:cNvPicPr preferRelativeResize="0"/>
           <p:nvPr/>
         </p:nvPicPr>
@@ -16816,7 +16964,7 @@
   <p:cSld>
     <p:spTree>
       <p:nvGrpSpPr>
-        <p:cNvPr id="278" name="Shape 278"/>
+        <p:cNvPr id="279" name="Shape 279"/>
         <p:cNvGrpSpPr/>
         <p:nvPr/>
       </p:nvGrpSpPr>
@@ -16830,7 +16978,7 @@
       </p:grpSpPr>
       <p:sp>
         <p:nvSpPr>
-          <p:cNvPr id="279" name="Google Shape;279;p44"/>
+          <p:cNvPr id="280" name="Google Shape;280;p44"/>
           <p:cNvSpPr txBox="1"/>
           <p:nvPr>
             <p:ph type="ctrTitle"/>
@@ -16870,7 +17018,7 @@
       </p:sp>
       <p:sp>
         <p:nvSpPr>
-          <p:cNvPr id="280" name="Google Shape;280;p44"/>
+          <p:cNvPr id="281" name="Google Shape;281;p44"/>
           <p:cNvSpPr txBox="1"/>
           <p:nvPr>
             <p:ph idx="1" type="subTitle"/>
@@ -16920,7 +17068,7 @@
   <p:cSld>
     <p:spTree>
       <p:nvGrpSpPr>
-        <p:cNvPr id="284" name="Shape 284"/>
+        <p:cNvPr id="285" name="Shape 285"/>
         <p:cNvGrpSpPr/>
         <p:nvPr/>
       </p:nvGrpSpPr>
@@ -16934,7 +17082,7 @@
       </p:grpSpPr>
       <p:sp>
         <p:nvSpPr>
-          <p:cNvPr id="285" name="Google Shape;285;p45"/>
+          <p:cNvPr id="286" name="Google Shape;286;p45"/>
           <p:cNvSpPr txBox="1"/>
           <p:nvPr>
             <p:ph idx="1" type="body"/>
@@ -17113,7 +17261,7 @@
       </p:sp>
       <p:sp>
         <p:nvSpPr>
-          <p:cNvPr id="286" name="Google Shape;286;p45"/>
+          <p:cNvPr id="287" name="Google Shape;287;p45"/>
           <p:cNvSpPr txBox="1"/>
           <p:nvPr>
             <p:ph type="title"/>
@@ -17164,7 +17312,7 @@
   <p:cSld>
     <p:spTree>
       <p:nvGrpSpPr>
-        <p:cNvPr id="290" name="Shape 290"/>
+        <p:cNvPr id="291" name="Shape 291"/>
         <p:cNvGrpSpPr/>
         <p:nvPr/>
       </p:nvGrpSpPr>
@@ -17178,7 +17326,7 @@
       </p:grpSpPr>
       <p:sp>
         <p:nvSpPr>
-          <p:cNvPr id="291" name="Google Shape;291;p46"/>
+          <p:cNvPr id="292" name="Google Shape;292;p46"/>
           <p:cNvSpPr txBox="1"/>
           <p:nvPr>
             <p:ph type="ctrTitle"/>
@@ -17218,7 +17366,7 @@
       </p:sp>
       <p:sp>
         <p:nvSpPr>
-          <p:cNvPr id="292" name="Google Shape;292;p46"/>
+          <p:cNvPr id="293" name="Google Shape;293;p46"/>
           <p:cNvSpPr txBox="1"/>
           <p:nvPr>
             <p:ph idx="1" type="subTitle"/>
@@ -17268,7 +17416,7 @@
   <p:cSld>
     <p:spTree>
       <p:nvGrpSpPr>
-        <p:cNvPr id="296" name="Shape 296"/>
+        <p:cNvPr id="297" name="Shape 297"/>
         <p:cNvGrpSpPr/>
         <p:nvPr/>
       </p:nvGrpSpPr>
@@ -17282,7 +17430,7 @@
       </p:grpSpPr>
       <p:sp>
         <p:nvSpPr>
-          <p:cNvPr id="297" name="Google Shape;297;p47"/>
+          <p:cNvPr id="298" name="Google Shape;298;p47"/>
           <p:cNvSpPr txBox="1"/>
           <p:nvPr>
             <p:ph idx="1" type="body"/>
@@ -17340,7 +17488,11 @@
             </a:pPr>
             <a:r>
               <a:rPr b="1" lang="en" sz="2000"/>
-              <a:t>Expansive Search Space: </a:t>
+              <a:t>Expansive Search Space</a:t>
+            </a:r>
+            <a:r>
+              <a:rPr b="1" lang="en" sz="2000"/>
+              <a:t>: </a:t>
             </a:r>
             <a:r>
               <a:rPr lang="en" sz="2000"/>
@@ -17367,7 +17519,7 @@
               <a:rPr lang="en" sz="2000"/>
               <a:t>Uses ML to quickly predict the performance of program candidates</a:t>
             </a:r>
-            <a:endParaRPr b="1" sz="2000"/>
+            <a:endParaRPr sz="2000"/>
           </a:p>
           <a:p>
             <a:pPr indent="-355600" lvl="0" marL="457200" rtl="0" algn="l">
@@ -17382,32 +17534,44 @@
             </a:pPr>
             <a:r>
               <a:rPr b="1" lang="en" sz="2000"/>
+              <a:t>Evolutionary Algorithm</a:t>
+            </a:r>
+            <a:r>
+              <a:rPr lang="en" sz="2000"/>
+              <a:t>: Take the best </a:t>
+            </a:r>
+            <a:r>
+              <a:rPr lang="en" sz="2000"/>
+              <a:t>program</a:t>
+            </a:r>
+            <a:r>
+              <a:rPr lang="en" sz="2000"/>
+              <a:t> revisions and </a:t>
+            </a:r>
+            <a:r>
+              <a:rPr lang="en" sz="2000"/>
+              <a:t>propagate</a:t>
+            </a:r>
+            <a:endParaRPr sz="2000"/>
+          </a:p>
+          <a:p>
+            <a:pPr indent="-355600" lvl="0" marL="457200" rtl="0" algn="l">
+              <a:spcBef>
+                <a:spcPts val="0"/>
+              </a:spcBef>
+              <a:spcAft>
+                <a:spcPts val="0"/>
+              </a:spcAft>
+              <a:buSzPts val="2000"/>
+              <a:buChar char="●"/>
+            </a:pPr>
+            <a:r>
+              <a:rPr b="1" lang="en" sz="2000"/>
               <a:t>Hardware-Adaptive: </a:t>
             </a:r>
             <a:r>
               <a:rPr lang="en" sz="2000"/>
               <a:t>Automatically optimizes for any target hardware (CPU, GPU, etc.)</a:t>
-            </a:r>
-            <a:endParaRPr b="1" sz="2000"/>
-          </a:p>
-          <a:p>
-            <a:pPr indent="-355600" lvl="0" marL="457200" rtl="0" algn="l">
-              <a:spcBef>
-                <a:spcPts val="0"/>
-              </a:spcBef>
-              <a:spcAft>
-                <a:spcPts val="0"/>
-              </a:spcAft>
-              <a:buSzPts val="2000"/>
-              <a:buChar char="●"/>
-            </a:pPr>
-            <a:r>
-              <a:rPr b="1" lang="en" sz="2000"/>
-              <a:t>State-of-the-Art Speedups: </a:t>
-            </a:r>
-            <a:r>
-              <a:rPr lang="en" sz="2000"/>
-              <a:t>Delivers major end-to-end performance gains over prior methods like AutoTVM</a:t>
             </a:r>
             <a:endParaRPr sz="2000"/>
           </a:p>
@@ -17415,7 +17579,7 @@
       </p:sp>
       <p:sp>
         <p:nvSpPr>
-          <p:cNvPr id="298" name="Google Shape;298;p47"/>
+          <p:cNvPr id="299" name="Google Shape;299;p47"/>
           <p:cNvSpPr txBox="1"/>
           <p:nvPr>
             <p:ph type="title"/>
@@ -17448,6 +17612,110 @@
             <a:r>
               <a:rPr lang="en"/>
               <a:t>What made Ansor so Revolutionary</a:t>
+            </a:r>
+            <a:endParaRPr/>
+          </a:p>
+        </p:txBody>
+      </p:sp>
+    </p:spTree>
+  </p:cSld>
+  <p:clrMapOvr>
+    <a:masterClrMapping/>
+  </p:clrMapOvr>
+</p:sld>
+</file>
+
+<file path=ppt/slides/slide36.xml><?xml version="1.0" encoding="utf-8"?>
+<p:sld xmlns:a="http://schemas.openxmlformats.org/drawingml/2006/main" xmlns:r="http://schemas.openxmlformats.org/officeDocument/2006/relationships" xmlns:mc="http://schemas.openxmlformats.org/markup-compatibility/2006" xmlns:mv="urn:schemas-microsoft-com:mac:vml" xmlns:p="http://schemas.openxmlformats.org/presentationml/2006/main" xmlns:c="http://schemas.openxmlformats.org/drawingml/2006/chart" xmlns:dgm="http://schemas.openxmlformats.org/drawingml/2006/diagram" xmlns:o="urn:schemas-microsoft-com:office:office" xmlns:v="urn:schemas-microsoft-com:vml" xmlns:pvml="urn:schemas-microsoft-com:office:powerpoint" xmlns:com="http://schemas.openxmlformats.org/drawingml/2006/compatibility" xmlns:p14="http://schemas.microsoft.com/office/powerpoint/2010/main" xmlns:p15="http://schemas.microsoft.com/office/powerpoint/2012/main" xmlns:ahyp="http://schemas.microsoft.com/office/drawing/2018/hyperlinkcolor">
+  <p:cSld>
+    <p:spTree>
+      <p:nvGrpSpPr>
+        <p:cNvPr id="303" name="Shape 303"/>
+        <p:cNvGrpSpPr/>
+        <p:nvPr/>
+      </p:nvGrpSpPr>
+      <p:grpSpPr>
+        <a:xfrm>
+          <a:off x="0" y="0"/>
+          <a:ext cx="0" cy="0"/>
+          <a:chOff x="0" y="0"/>
+          <a:chExt cx="0" cy="0"/>
+        </a:xfrm>
+      </p:grpSpPr>
+      <p:sp>
+        <p:nvSpPr>
+          <p:cNvPr id="304" name="Google Shape;304;p48"/>
+          <p:cNvSpPr txBox="1"/>
+          <p:nvPr>
+            <p:ph type="ctrTitle"/>
+          </p:nvPr>
+        </p:nvSpPr>
+        <p:spPr>
+          <a:xfrm>
+            <a:off x="311708" y="744575"/>
+            <a:ext cx="8520600" cy="2052600"/>
+          </a:xfrm>
+          <a:prstGeom prst="rect">
+            <a:avLst/>
+          </a:prstGeom>
+        </p:spPr>
+        <p:txBody>
+          <a:bodyPr anchorCtr="0" anchor="b" bIns="91425" lIns="91425" spcFirstLastPara="1" rIns="91425" wrap="square" tIns="91425">
+            <a:normAutofit/>
+          </a:bodyPr>
+          <a:lstStyle/>
+          <a:p>
+            <a:pPr indent="0" lvl="0" marL="0" rtl="0" algn="ctr">
+              <a:spcBef>
+                <a:spcPts val="0"/>
+              </a:spcBef>
+              <a:spcAft>
+                <a:spcPts val="0"/>
+              </a:spcAft>
+              <a:buNone/>
+            </a:pPr>
+            <a:r>
+              <a:rPr lang="en"/>
+              <a:t>Thank you!</a:t>
+            </a:r>
+            <a:endParaRPr/>
+          </a:p>
+        </p:txBody>
+      </p:sp>
+      <p:sp>
+        <p:nvSpPr>
+          <p:cNvPr id="305" name="Google Shape;305;p48"/>
+          <p:cNvSpPr txBox="1"/>
+          <p:nvPr>
+            <p:ph idx="1" type="subTitle"/>
+          </p:nvPr>
+        </p:nvSpPr>
+        <p:spPr>
+          <a:xfrm>
+            <a:off x="311700" y="2834125"/>
+            <a:ext cx="8520600" cy="792600"/>
+          </a:xfrm>
+          <a:prstGeom prst="rect">
+            <a:avLst/>
+          </a:prstGeom>
+        </p:spPr>
+        <p:txBody>
+          <a:bodyPr anchorCtr="0" anchor="t" bIns="91425" lIns="91425" spcFirstLastPara="1" rIns="91425" wrap="square" tIns="91425">
+            <a:normAutofit/>
+          </a:bodyPr>
+          <a:lstStyle/>
+          <a:p>
+            <a:pPr indent="0" lvl="0" marL="0" rtl="0" algn="ctr">
+              <a:spcBef>
+                <a:spcPts val="0"/>
+              </a:spcBef>
+              <a:spcAft>
+                <a:spcPts val="0"/>
+              </a:spcAft>
+              <a:buNone/>
+            </a:pPr>
+            <a:r>
+              <a:t/>
             </a:r>
             <a:endParaRPr/>
           </a:p>
@@ -17466,7 +17734,7 @@
   <p:cSld>
     <p:spTree>
       <p:nvGrpSpPr>
-        <p:cNvPr id="71" name="Shape 71"/>
+        <p:cNvPr id="72" name="Shape 72"/>
         <p:cNvGrpSpPr/>
         <p:nvPr/>
       </p:nvGrpSpPr>
@@ -17480,7 +17748,7 @@
       </p:grpSpPr>
       <p:sp>
         <p:nvSpPr>
-          <p:cNvPr id="72" name="Google Shape;72;p16"/>
+          <p:cNvPr id="73" name="Google Shape;73;p16"/>
           <p:cNvSpPr txBox="1"/>
           <p:nvPr>
             <p:ph type="title"/>
@@ -17520,7 +17788,7 @@
       </p:sp>
       <p:pic>
         <p:nvPicPr>
-          <p:cNvPr id="73" name="Google Shape;73;p16"/>
+          <p:cNvPr id="74" name="Google Shape;74;p16"/>
           <p:cNvPicPr preferRelativeResize="0"/>
           <p:nvPr/>
         </p:nvPicPr>
@@ -17548,7 +17816,7 @@
       </p:pic>
       <p:sp>
         <p:nvSpPr>
-          <p:cNvPr id="74" name="Google Shape;74;p16"/>
+          <p:cNvPr id="75" name="Google Shape;75;p16"/>
           <p:cNvSpPr txBox="1"/>
           <p:nvPr>
             <p:ph idx="1" type="body"/>
@@ -17712,7 +17980,7 @@
   <p:cSld>
     <p:spTree>
       <p:nvGrpSpPr>
-        <p:cNvPr id="78" name="Shape 78"/>
+        <p:cNvPr id="79" name="Shape 79"/>
         <p:cNvGrpSpPr/>
         <p:nvPr/>
       </p:nvGrpSpPr>
@@ -17726,7 +17994,7 @@
       </p:grpSpPr>
       <p:sp>
         <p:nvSpPr>
-          <p:cNvPr id="79" name="Google Shape;79;p17"/>
+          <p:cNvPr id="80" name="Google Shape;80;p17"/>
           <p:cNvSpPr txBox="1"/>
           <p:nvPr>
             <p:ph type="ctrTitle"/>
@@ -17766,7 +18034,7 @@
       </p:sp>
       <p:sp>
         <p:nvSpPr>
-          <p:cNvPr id="80" name="Google Shape;80;p17"/>
+          <p:cNvPr id="81" name="Google Shape;81;p17"/>
           <p:cNvSpPr txBox="1"/>
           <p:nvPr>
             <p:ph idx="1" type="subTitle"/>
@@ -17816,7 +18084,7 @@
   <p:cSld>
     <p:spTree>
       <p:nvGrpSpPr>
-        <p:cNvPr id="84" name="Shape 84"/>
+        <p:cNvPr id="85" name="Shape 85"/>
         <p:cNvGrpSpPr/>
         <p:nvPr/>
       </p:nvGrpSpPr>
@@ -17830,7 +18098,7 @@
       </p:grpSpPr>
       <p:sp>
         <p:nvSpPr>
-          <p:cNvPr id="85" name="Google Shape;85;p18"/>
+          <p:cNvPr id="86" name="Google Shape;86;p18"/>
           <p:cNvSpPr txBox="1"/>
           <p:nvPr>
             <p:ph type="title"/>
@@ -17870,7 +18138,7 @@
       </p:sp>
       <p:sp>
         <p:nvSpPr>
-          <p:cNvPr id="86" name="Google Shape;86;p18"/>
+          <p:cNvPr id="87" name="Google Shape;87;p18"/>
           <p:cNvSpPr txBox="1"/>
           <p:nvPr>
             <p:ph idx="1" type="body"/>
@@ -18091,7 +18359,7 @@
       </p:sp>
       <p:pic>
         <p:nvPicPr>
-          <p:cNvPr id="87" name="Google Shape;87;p18"/>
+          <p:cNvPr id="88" name="Google Shape;88;p18"/>
           <p:cNvPicPr preferRelativeResize="0"/>
           <p:nvPr/>
         </p:nvPicPr>
@@ -18129,7 +18397,7 @@
   <p:cSld>
     <p:spTree>
       <p:nvGrpSpPr>
-        <p:cNvPr id="91" name="Shape 91"/>
+        <p:cNvPr id="92" name="Shape 92"/>
         <p:cNvGrpSpPr/>
         <p:nvPr/>
       </p:nvGrpSpPr>
@@ -18143,7 +18411,7 @@
       </p:grpSpPr>
       <p:sp>
         <p:nvSpPr>
-          <p:cNvPr id="92" name="Google Shape;92;p19"/>
+          <p:cNvPr id="93" name="Google Shape;93;p19"/>
           <p:cNvSpPr txBox="1"/>
           <p:nvPr>
             <p:ph idx="1" type="body"/>
@@ -18357,7 +18625,7 @@
       </p:sp>
       <p:sp>
         <p:nvSpPr>
-          <p:cNvPr id="93" name="Google Shape;93;p19"/>
+          <p:cNvPr id="94" name="Google Shape;94;p19"/>
           <p:cNvSpPr txBox="1"/>
           <p:nvPr>
             <p:ph type="title"/>
@@ -18408,7 +18676,7 @@
   <p:cSld>
     <p:spTree>
       <p:nvGrpSpPr>
-        <p:cNvPr id="97" name="Shape 97"/>
+        <p:cNvPr id="98" name="Shape 98"/>
         <p:cNvGrpSpPr/>
         <p:nvPr/>
       </p:nvGrpSpPr>
@@ -18422,7 +18690,7 @@
       </p:grpSpPr>
       <p:sp>
         <p:nvSpPr>
-          <p:cNvPr id="98" name="Google Shape;98;p20"/>
+          <p:cNvPr id="99" name="Google Shape;99;p20"/>
           <p:cNvSpPr txBox="1"/>
           <p:nvPr>
             <p:ph idx="1" type="body"/>
@@ -18610,7 +18878,7 @@
       </p:sp>
       <p:sp>
         <p:nvSpPr>
-          <p:cNvPr id="99" name="Google Shape;99;p20"/>
+          <p:cNvPr id="100" name="Google Shape;100;p20"/>
           <p:cNvSpPr txBox="1"/>
           <p:nvPr>
             <p:ph type="title"/>
@@ -18665,7 +18933,7 @@
   <p:cSld>
     <p:spTree>
       <p:nvGrpSpPr>
-        <p:cNvPr id="103" name="Shape 103"/>
+        <p:cNvPr id="104" name="Shape 104"/>
         <p:cNvGrpSpPr/>
         <p:nvPr/>
       </p:nvGrpSpPr>
@@ -18679,7 +18947,7 @@
       </p:grpSpPr>
       <p:sp>
         <p:nvSpPr>
-          <p:cNvPr id="104" name="Google Shape;104;p21"/>
+          <p:cNvPr id="105" name="Google Shape;105;p21"/>
           <p:cNvSpPr txBox="1"/>
           <p:nvPr>
             <p:ph type="ctrTitle"/>
@@ -18719,7 +18987,7 @@
       </p:sp>
       <p:sp>
         <p:nvSpPr>
-          <p:cNvPr id="105" name="Google Shape;105;p21"/>
+          <p:cNvPr id="106" name="Google Shape;106;p21"/>
           <p:cNvSpPr txBox="1"/>
           <p:nvPr>
             <p:ph idx="1" type="subTitle"/>

</xml_diff>